<commit_message>
added documentation for model desciption and preliminary results
</commit_message>
<xml_diff>
--- a/Simplified working model.pptx
+++ b/Simplified working model.pptx
@@ -5,7 +5,7 @@
     <p:sldMasterId id="2147483648" r:id="rId1"/>
   </p:sldMasterIdLst>
   <p:notesMasterIdLst>
-    <p:notesMasterId r:id="rId23"/>
+    <p:notesMasterId r:id="rId24"/>
   </p:notesMasterIdLst>
   <p:sldIdLst>
     <p:sldId id="259" r:id="rId2"/>
@@ -22,13 +22,14 @@
     <p:sldId id="280" r:id="rId13"/>
     <p:sldId id="274" r:id="rId14"/>
     <p:sldId id="281" r:id="rId15"/>
-    <p:sldId id="261" r:id="rId16"/>
-    <p:sldId id="262" r:id="rId17"/>
-    <p:sldId id="268" r:id="rId18"/>
-    <p:sldId id="266" r:id="rId19"/>
-    <p:sldId id="267" r:id="rId20"/>
-    <p:sldId id="272" r:id="rId21"/>
-    <p:sldId id="273" r:id="rId22"/>
+    <p:sldId id="282" r:id="rId16"/>
+    <p:sldId id="261" r:id="rId17"/>
+    <p:sldId id="262" r:id="rId18"/>
+    <p:sldId id="268" r:id="rId19"/>
+    <p:sldId id="266" r:id="rId20"/>
+    <p:sldId id="267" r:id="rId21"/>
+    <p:sldId id="272" r:id="rId22"/>
+    <p:sldId id="273" r:id="rId23"/>
   </p:sldIdLst>
   <p:sldSz cx="12192000" cy="6858000"/>
   <p:notesSz cx="6858000" cy="9144000"/>
@@ -10285,6 +10286,4230 @@
           <a:chExt cx="0" cy="0"/>
         </a:xfrm>
       </p:grpSpPr>
+      <p:grpSp>
+        <p:nvGrpSpPr>
+          <p:cNvPr id="78" name="Group 77">
+            <a:extLst>
+              <a:ext uri="{FF2B5EF4-FFF2-40B4-BE49-F238E27FC236}">
+                <a16:creationId xmlns:a16="http://schemas.microsoft.com/office/drawing/2014/main" id="{C40779B4-17B9-6C40-B991-ECC902B1E084}"/>
+              </a:ext>
+            </a:extLst>
+          </p:cNvPr>
+          <p:cNvGrpSpPr/>
+          <p:nvPr/>
+        </p:nvGrpSpPr>
+        <p:grpSpPr>
+          <a:xfrm>
+            <a:off x="1671141" y="798275"/>
+            <a:ext cx="8472897" cy="4985897"/>
+            <a:chOff x="1119609" y="275771"/>
+            <a:chExt cx="8472897" cy="4985897"/>
+          </a:xfrm>
+        </p:grpSpPr>
+        <mc:AlternateContent xmlns:mc="http://schemas.openxmlformats.org/markup-compatibility/2006">
+          <mc:Choice xmlns:a14="http://schemas.microsoft.com/office/drawing/2010/main" Requires="a14">
+            <p:sp>
+              <p:nvSpPr>
+                <p:cNvPr id="4" name="Oval 3">
+                  <a:extLst>
+                    <a:ext uri="{FF2B5EF4-FFF2-40B4-BE49-F238E27FC236}">
+                      <a16:creationId xmlns:a16="http://schemas.microsoft.com/office/drawing/2014/main" id="{5B0912DE-51DF-F24A-8480-9CF4999E1A8B}"/>
+                    </a:ext>
+                  </a:extLst>
+                </p:cNvPr>
+                <p:cNvSpPr/>
+                <p:nvPr/>
+              </p:nvSpPr>
+              <p:spPr>
+                <a:xfrm>
+                  <a:off x="1119609" y="1569097"/>
+                  <a:ext cx="645253" cy="645252"/>
+                </a:xfrm>
+                <a:prstGeom prst="ellipse">
+                  <a:avLst/>
+                </a:prstGeom>
+                <a:ln>
+                  <a:solidFill>
+                    <a:schemeClr val="tx1"/>
+                  </a:solidFill>
+                </a:ln>
+              </p:spPr>
+              <p:style>
+                <a:lnRef idx="2">
+                  <a:schemeClr val="accent6"/>
+                </a:lnRef>
+                <a:fillRef idx="1">
+                  <a:schemeClr val="lt1"/>
+                </a:fillRef>
+                <a:effectRef idx="0">
+                  <a:schemeClr val="accent6"/>
+                </a:effectRef>
+                <a:fontRef idx="minor">
+                  <a:schemeClr val="dk1"/>
+                </a:fontRef>
+              </p:style>
+              <p:txBody>
+                <a:bodyPr rtlCol="0" anchor="ctr"/>
+                <a:lstStyle/>
+                <a:p>
+                  <a:pPr algn="ctr"/>
+                  <a14:m>
+                    <m:oMathPara xmlns:m="http://schemas.openxmlformats.org/officeDocument/2006/math">
+                      <m:oMathParaPr>
+                        <m:jc m:val="centerGroup"/>
+                      </m:oMathParaPr>
+                      <m:oMath xmlns:m="http://schemas.openxmlformats.org/officeDocument/2006/math">
+                        <m:r>
+                          <a:rPr lang="en-US" b="0" i="1" smtClean="0">
+                            <a:latin typeface="Cambria Math" panose="02040503050406030204" pitchFamily="18" charset="0"/>
+                          </a:rPr>
+                          <m:t>𝐸</m:t>
+                        </m:r>
+                      </m:oMath>
+                    </m:oMathPara>
+                  </a14:m>
+                  <a:endParaRPr lang="en-US" dirty="0"/>
+                </a:p>
+              </p:txBody>
+            </p:sp>
+          </mc:Choice>
+          <mc:Fallback>
+            <p:sp>
+              <p:nvSpPr>
+                <p:cNvPr id="4" name="Oval 3">
+                  <a:extLst>
+                    <a:ext uri="{FF2B5EF4-FFF2-40B4-BE49-F238E27FC236}">
+                      <a16:creationId xmlns:a16="http://schemas.microsoft.com/office/drawing/2014/main" id="{5B0912DE-51DF-F24A-8480-9CF4999E1A8B}"/>
+                    </a:ext>
+                  </a:extLst>
+                </p:cNvPr>
+                <p:cNvSpPr>
+                  <a:spLocks noRot="1" noChangeAspect="1" noMove="1" noResize="1" noEditPoints="1" noAdjustHandles="1" noChangeArrowheads="1" noChangeShapeType="1" noTextEdit="1"/>
+                </p:cNvSpPr>
+                <p:nvPr/>
+              </p:nvSpPr>
+              <p:spPr>
+                <a:xfrm>
+                  <a:off x="1119609" y="1569097"/>
+                  <a:ext cx="645253" cy="645252"/>
+                </a:xfrm>
+                <a:prstGeom prst="ellipse">
+                  <a:avLst/>
+                </a:prstGeom>
+                <a:blipFill>
+                  <a:blip r:embed="rId2"/>
+                  <a:stretch>
+                    <a:fillRect/>
+                  </a:stretch>
+                </a:blipFill>
+                <a:ln>
+                  <a:solidFill>
+                    <a:schemeClr val="tx1"/>
+                  </a:solidFill>
+                </a:ln>
+              </p:spPr>
+              <p:txBody>
+                <a:bodyPr/>
+                <a:lstStyle/>
+                <a:p>
+                  <a:r>
+                    <a:rPr lang="en-US">
+                      <a:noFill/>
+                    </a:rPr>
+                    <a:t> </a:t>
+                  </a:r>
+                </a:p>
+              </p:txBody>
+            </p:sp>
+          </mc:Fallback>
+        </mc:AlternateContent>
+        <mc:AlternateContent xmlns:mc="http://schemas.openxmlformats.org/markup-compatibility/2006">
+          <mc:Choice xmlns:a14="http://schemas.microsoft.com/office/drawing/2010/main" Requires="a14">
+            <p:sp>
+              <p:nvSpPr>
+                <p:cNvPr id="5" name="Oval 4">
+                  <a:extLst>
+                    <a:ext uri="{FF2B5EF4-FFF2-40B4-BE49-F238E27FC236}">
+                      <a16:creationId xmlns:a16="http://schemas.microsoft.com/office/drawing/2014/main" id="{79BA2D8C-E1F8-A74F-8470-5090CAF30252}"/>
+                    </a:ext>
+                  </a:extLst>
+                </p:cNvPr>
+                <p:cNvSpPr/>
+                <p:nvPr/>
+              </p:nvSpPr>
+              <p:spPr>
+                <a:xfrm>
+                  <a:off x="2552169" y="1569097"/>
+                  <a:ext cx="645253" cy="645252"/>
+                </a:xfrm>
+                <a:prstGeom prst="ellipse">
+                  <a:avLst/>
+                </a:prstGeom>
+                <a:ln>
+                  <a:solidFill>
+                    <a:schemeClr val="tx1"/>
+                  </a:solidFill>
+                </a:ln>
+              </p:spPr>
+              <p:style>
+                <a:lnRef idx="2">
+                  <a:schemeClr val="accent6"/>
+                </a:lnRef>
+                <a:fillRef idx="1">
+                  <a:schemeClr val="lt1"/>
+                </a:fillRef>
+                <a:effectRef idx="0">
+                  <a:schemeClr val="accent6"/>
+                </a:effectRef>
+                <a:fontRef idx="minor">
+                  <a:schemeClr val="dk1"/>
+                </a:fontRef>
+              </p:style>
+              <p:txBody>
+                <a:bodyPr rtlCol="0" anchor="ctr"/>
+                <a:lstStyle/>
+                <a:p>
+                  <a:pPr algn="ctr"/>
+                  <a14:m>
+                    <m:oMathPara xmlns:m="http://schemas.openxmlformats.org/officeDocument/2006/math">
+                      <m:oMathParaPr>
+                        <m:jc m:val="centerGroup"/>
+                      </m:oMathParaPr>
+                      <m:oMath xmlns:m="http://schemas.openxmlformats.org/officeDocument/2006/math">
+                        <m:sSub>
+                          <m:sSubPr>
+                            <m:ctrlPr>
+                              <a:rPr lang="en-US" b="0" i="1" smtClean="0">
+                                <a:latin typeface="Cambria Math" panose="02040503050406030204" pitchFamily="18" charset="0"/>
+                              </a:rPr>
+                            </m:ctrlPr>
+                          </m:sSubPr>
+                          <m:e>
+                            <m:r>
+                              <a:rPr lang="en-US" b="0" i="1" smtClean="0">
+                                <a:latin typeface="Cambria Math" panose="02040503050406030204" pitchFamily="18" charset="0"/>
+                              </a:rPr>
+                              <m:t>𝐼</m:t>
+                            </m:r>
+                          </m:e>
+                          <m:sub>
+                            <m:r>
+                              <a:rPr lang="en-US" b="0" i="1" smtClean="0">
+                                <a:latin typeface="Cambria Math" panose="02040503050406030204" pitchFamily="18" charset="0"/>
+                              </a:rPr>
+                              <m:t>𝑠h𝑒𝑑</m:t>
+                            </m:r>
+                          </m:sub>
+                        </m:sSub>
+                      </m:oMath>
+                    </m:oMathPara>
+                  </a14:m>
+                  <a:endParaRPr lang="en-US" dirty="0"/>
+                </a:p>
+              </p:txBody>
+            </p:sp>
+          </mc:Choice>
+          <mc:Fallback>
+            <p:sp>
+              <p:nvSpPr>
+                <p:cNvPr id="5" name="Oval 4">
+                  <a:extLst>
+                    <a:ext uri="{FF2B5EF4-FFF2-40B4-BE49-F238E27FC236}">
+                      <a16:creationId xmlns:a16="http://schemas.microsoft.com/office/drawing/2014/main" id="{79BA2D8C-E1F8-A74F-8470-5090CAF30252}"/>
+                    </a:ext>
+                  </a:extLst>
+                </p:cNvPr>
+                <p:cNvSpPr>
+                  <a:spLocks noRot="1" noChangeAspect="1" noMove="1" noResize="1" noEditPoints="1" noAdjustHandles="1" noChangeArrowheads="1" noChangeShapeType="1" noTextEdit="1"/>
+                </p:cNvSpPr>
+                <p:nvPr/>
+              </p:nvSpPr>
+              <p:spPr>
+                <a:xfrm>
+                  <a:off x="2552169" y="1569097"/>
+                  <a:ext cx="645253" cy="645252"/>
+                </a:xfrm>
+                <a:prstGeom prst="ellipse">
+                  <a:avLst/>
+                </a:prstGeom>
+                <a:blipFill>
+                  <a:blip r:embed="rId3"/>
+                  <a:stretch>
+                    <a:fillRect l="-1887"/>
+                  </a:stretch>
+                </a:blipFill>
+                <a:ln>
+                  <a:solidFill>
+                    <a:schemeClr val="tx1"/>
+                  </a:solidFill>
+                </a:ln>
+              </p:spPr>
+              <p:txBody>
+                <a:bodyPr/>
+                <a:lstStyle/>
+                <a:p>
+                  <a:r>
+                    <a:rPr lang="en-US">
+                      <a:noFill/>
+                    </a:rPr>
+                    <a:t> </a:t>
+                  </a:r>
+                </a:p>
+              </p:txBody>
+            </p:sp>
+          </mc:Fallback>
+        </mc:AlternateContent>
+        <mc:AlternateContent xmlns:mc="http://schemas.openxmlformats.org/markup-compatibility/2006">
+          <mc:Choice xmlns:a14="http://schemas.microsoft.com/office/drawing/2010/main" Requires="a14">
+            <p:sp>
+              <p:nvSpPr>
+                <p:cNvPr id="6" name="Oval 5">
+                  <a:extLst>
+                    <a:ext uri="{FF2B5EF4-FFF2-40B4-BE49-F238E27FC236}">
+                      <a16:creationId xmlns:a16="http://schemas.microsoft.com/office/drawing/2014/main" id="{776A6DDC-F579-DD43-9909-6B4B79BAAE09}"/>
+                    </a:ext>
+                  </a:extLst>
+                </p:cNvPr>
+                <p:cNvSpPr/>
+                <p:nvPr/>
+              </p:nvSpPr>
+              <p:spPr>
+                <a:xfrm>
+                  <a:off x="3984729" y="1569097"/>
+                  <a:ext cx="645253" cy="645252"/>
+                </a:xfrm>
+                <a:prstGeom prst="ellipse">
+                  <a:avLst/>
+                </a:prstGeom>
+                <a:ln>
+                  <a:solidFill>
+                    <a:schemeClr val="tx1"/>
+                  </a:solidFill>
+                </a:ln>
+              </p:spPr>
+              <p:style>
+                <a:lnRef idx="2">
+                  <a:schemeClr val="accent6"/>
+                </a:lnRef>
+                <a:fillRef idx="1">
+                  <a:schemeClr val="lt1"/>
+                </a:fillRef>
+                <a:effectRef idx="0">
+                  <a:schemeClr val="accent6"/>
+                </a:effectRef>
+                <a:fontRef idx="minor">
+                  <a:schemeClr val="dk1"/>
+                </a:fontRef>
+              </p:style>
+              <p:txBody>
+                <a:bodyPr rtlCol="0" anchor="ctr"/>
+                <a:lstStyle/>
+                <a:p>
+                  <a:pPr algn="ctr"/>
+                  <a14:m>
+                    <m:oMathPara xmlns:m="http://schemas.openxmlformats.org/officeDocument/2006/math">
+                      <m:oMathParaPr>
+                        <m:jc m:val="centerGroup"/>
+                      </m:oMathParaPr>
+                      <m:oMath xmlns:m="http://schemas.openxmlformats.org/officeDocument/2006/math">
+                        <m:sSub>
+                          <m:sSubPr>
+                            <m:ctrlPr>
+                              <a:rPr lang="en-US" b="0" i="1" smtClean="0">
+                                <a:latin typeface="Cambria Math" panose="02040503050406030204" pitchFamily="18" charset="0"/>
+                              </a:rPr>
+                            </m:ctrlPr>
+                          </m:sSubPr>
+                          <m:e>
+                            <m:r>
+                              <a:rPr lang="en-US" b="0" i="1" smtClean="0">
+                                <a:latin typeface="Cambria Math" panose="02040503050406030204" pitchFamily="18" charset="0"/>
+                              </a:rPr>
+                              <m:t>𝐼</m:t>
+                            </m:r>
+                          </m:e>
+                          <m:sub>
+                            <m:r>
+                              <a:rPr lang="en-US" b="0" i="1" smtClean="0">
+                                <a:latin typeface="Cambria Math" panose="02040503050406030204" pitchFamily="18" charset="0"/>
+                              </a:rPr>
+                              <m:t>𝑠</m:t>
+                            </m:r>
+                            <m:r>
+                              <a:rPr lang="en-US" b="0" i="1" smtClean="0">
+                                <a:latin typeface="Cambria Math" panose="02040503050406030204" pitchFamily="18" charset="0"/>
+                              </a:rPr>
+                              <m:t>, 0</m:t>
+                            </m:r>
+                          </m:sub>
+                        </m:sSub>
+                      </m:oMath>
+                    </m:oMathPara>
+                  </a14:m>
+                  <a:endParaRPr lang="en-US" dirty="0"/>
+                </a:p>
+              </p:txBody>
+            </p:sp>
+          </mc:Choice>
+          <mc:Fallback>
+            <p:sp>
+              <p:nvSpPr>
+                <p:cNvPr id="6" name="Oval 5">
+                  <a:extLst>
+                    <a:ext uri="{FF2B5EF4-FFF2-40B4-BE49-F238E27FC236}">
+                      <a16:creationId xmlns:a16="http://schemas.microsoft.com/office/drawing/2014/main" id="{776A6DDC-F579-DD43-9909-6B4B79BAAE09}"/>
+                    </a:ext>
+                  </a:extLst>
+                </p:cNvPr>
+                <p:cNvSpPr>
+                  <a:spLocks noRot="1" noChangeAspect="1" noMove="1" noResize="1" noEditPoints="1" noAdjustHandles="1" noChangeArrowheads="1" noChangeShapeType="1" noTextEdit="1"/>
+                </p:cNvSpPr>
+                <p:nvPr/>
+              </p:nvSpPr>
+              <p:spPr>
+                <a:xfrm>
+                  <a:off x="3984729" y="1569097"/>
+                  <a:ext cx="645253" cy="645252"/>
+                </a:xfrm>
+                <a:prstGeom prst="ellipse">
+                  <a:avLst/>
+                </a:prstGeom>
+                <a:blipFill>
+                  <a:blip r:embed="rId4"/>
+                  <a:stretch>
+                    <a:fillRect/>
+                  </a:stretch>
+                </a:blipFill>
+                <a:ln>
+                  <a:solidFill>
+                    <a:schemeClr val="tx1"/>
+                  </a:solidFill>
+                </a:ln>
+              </p:spPr>
+              <p:txBody>
+                <a:bodyPr/>
+                <a:lstStyle/>
+                <a:p>
+                  <a:r>
+                    <a:rPr lang="en-US">
+                      <a:noFill/>
+                    </a:rPr>
+                    <a:t> </a:t>
+                  </a:r>
+                </a:p>
+              </p:txBody>
+            </p:sp>
+          </mc:Fallback>
+        </mc:AlternateContent>
+        <mc:AlternateContent xmlns:mc="http://schemas.openxmlformats.org/markup-compatibility/2006">
+          <mc:Choice xmlns:a14="http://schemas.microsoft.com/office/drawing/2010/main" Requires="a14">
+            <p:sp>
+              <p:nvSpPr>
+                <p:cNvPr id="7" name="Oval 6">
+                  <a:extLst>
+                    <a:ext uri="{FF2B5EF4-FFF2-40B4-BE49-F238E27FC236}">
+                      <a16:creationId xmlns:a16="http://schemas.microsoft.com/office/drawing/2014/main" id="{13124F4F-A2E1-B04C-B291-F8DC1F7869EC}"/>
+                    </a:ext>
+                  </a:extLst>
+                </p:cNvPr>
+                <p:cNvSpPr/>
+                <p:nvPr/>
+              </p:nvSpPr>
+              <p:spPr>
+                <a:xfrm>
+                  <a:off x="3984728" y="2910217"/>
+                  <a:ext cx="645253" cy="645252"/>
+                </a:xfrm>
+                <a:prstGeom prst="ellipse">
+                  <a:avLst/>
+                </a:prstGeom>
+                <a:ln>
+                  <a:solidFill>
+                    <a:schemeClr val="tx1"/>
+                  </a:solidFill>
+                </a:ln>
+              </p:spPr>
+              <p:style>
+                <a:lnRef idx="2">
+                  <a:schemeClr val="accent6"/>
+                </a:lnRef>
+                <a:fillRef idx="1">
+                  <a:schemeClr val="lt1"/>
+                </a:fillRef>
+                <a:effectRef idx="0">
+                  <a:schemeClr val="accent6"/>
+                </a:effectRef>
+                <a:fontRef idx="minor">
+                  <a:schemeClr val="dk1"/>
+                </a:fontRef>
+              </p:style>
+              <p:txBody>
+                <a:bodyPr rtlCol="0" anchor="ctr"/>
+                <a:lstStyle/>
+                <a:p>
+                  <a:pPr algn="ctr"/>
+                  <a14:m>
+                    <m:oMathPara xmlns:m="http://schemas.openxmlformats.org/officeDocument/2006/math">
+                      <m:oMathParaPr>
+                        <m:jc m:val="centerGroup"/>
+                      </m:oMathParaPr>
+                      <m:oMath xmlns:m="http://schemas.openxmlformats.org/officeDocument/2006/math">
+                        <m:sSub>
+                          <m:sSubPr>
+                            <m:ctrlPr>
+                              <a:rPr lang="en-US" b="0" i="1" smtClean="0">
+                                <a:latin typeface="Cambria Math" panose="02040503050406030204" pitchFamily="18" charset="0"/>
+                              </a:rPr>
+                            </m:ctrlPr>
+                          </m:sSubPr>
+                          <m:e>
+                            <m:r>
+                              <a:rPr lang="en-US" b="0" i="1" smtClean="0">
+                                <a:latin typeface="Cambria Math" panose="02040503050406030204" pitchFamily="18" charset="0"/>
+                              </a:rPr>
+                              <m:t>𝐼</m:t>
+                            </m:r>
+                          </m:e>
+                          <m:sub>
+                            <m:r>
+                              <a:rPr lang="en-US" b="0" i="1" smtClean="0">
+                                <a:latin typeface="Cambria Math" panose="02040503050406030204" pitchFamily="18" charset="0"/>
+                              </a:rPr>
+                              <m:t>𝑠</m:t>
+                            </m:r>
+                            <m:r>
+                              <a:rPr lang="en-US" b="0" i="1" smtClean="0">
+                                <a:latin typeface="Cambria Math" panose="02040503050406030204" pitchFamily="18" charset="0"/>
+                              </a:rPr>
+                              <m:t>,1</m:t>
+                            </m:r>
+                          </m:sub>
+                        </m:sSub>
+                      </m:oMath>
+                    </m:oMathPara>
+                  </a14:m>
+                  <a:endParaRPr lang="en-US" dirty="0"/>
+                </a:p>
+              </p:txBody>
+            </p:sp>
+          </mc:Choice>
+          <mc:Fallback>
+            <p:sp>
+              <p:nvSpPr>
+                <p:cNvPr id="7" name="Oval 6">
+                  <a:extLst>
+                    <a:ext uri="{FF2B5EF4-FFF2-40B4-BE49-F238E27FC236}">
+                      <a16:creationId xmlns:a16="http://schemas.microsoft.com/office/drawing/2014/main" id="{13124F4F-A2E1-B04C-B291-F8DC1F7869EC}"/>
+                    </a:ext>
+                  </a:extLst>
+                </p:cNvPr>
+                <p:cNvSpPr>
+                  <a:spLocks noRot="1" noChangeAspect="1" noMove="1" noResize="1" noEditPoints="1" noAdjustHandles="1" noChangeArrowheads="1" noChangeShapeType="1" noTextEdit="1"/>
+                </p:cNvSpPr>
+                <p:nvPr/>
+              </p:nvSpPr>
+              <p:spPr>
+                <a:xfrm>
+                  <a:off x="3984728" y="2910217"/>
+                  <a:ext cx="645253" cy="645252"/>
+                </a:xfrm>
+                <a:prstGeom prst="ellipse">
+                  <a:avLst/>
+                </a:prstGeom>
+                <a:blipFill>
+                  <a:blip r:embed="rId5"/>
+                  <a:stretch>
+                    <a:fillRect/>
+                  </a:stretch>
+                </a:blipFill>
+                <a:ln>
+                  <a:solidFill>
+                    <a:schemeClr val="tx1"/>
+                  </a:solidFill>
+                </a:ln>
+              </p:spPr>
+              <p:txBody>
+                <a:bodyPr/>
+                <a:lstStyle/>
+                <a:p>
+                  <a:r>
+                    <a:rPr lang="en-US">
+                      <a:noFill/>
+                    </a:rPr>
+                    <a:t> </a:t>
+                  </a:r>
+                </a:p>
+              </p:txBody>
+            </p:sp>
+          </mc:Fallback>
+        </mc:AlternateContent>
+        <mc:AlternateContent xmlns:mc="http://schemas.openxmlformats.org/markup-compatibility/2006">
+          <mc:Choice xmlns:a14="http://schemas.microsoft.com/office/drawing/2010/main" Requires="a14">
+            <p:sp>
+              <p:nvSpPr>
+                <p:cNvPr id="8" name="Oval 7">
+                  <a:extLst>
+                    <a:ext uri="{FF2B5EF4-FFF2-40B4-BE49-F238E27FC236}">
+                      <a16:creationId xmlns:a16="http://schemas.microsoft.com/office/drawing/2014/main" id="{B9B980E0-E63A-B341-A7A7-E0F2049BE7FD}"/>
+                    </a:ext>
+                  </a:extLst>
+                </p:cNvPr>
+                <p:cNvSpPr/>
+                <p:nvPr/>
+              </p:nvSpPr>
+              <p:spPr>
+                <a:xfrm>
+                  <a:off x="3984727" y="4251337"/>
+                  <a:ext cx="645253" cy="645252"/>
+                </a:xfrm>
+                <a:prstGeom prst="ellipse">
+                  <a:avLst/>
+                </a:prstGeom>
+                <a:ln>
+                  <a:solidFill>
+                    <a:schemeClr val="tx1"/>
+                  </a:solidFill>
+                </a:ln>
+              </p:spPr>
+              <p:style>
+                <a:lnRef idx="2">
+                  <a:schemeClr val="accent6"/>
+                </a:lnRef>
+                <a:fillRef idx="1">
+                  <a:schemeClr val="lt1"/>
+                </a:fillRef>
+                <a:effectRef idx="0">
+                  <a:schemeClr val="accent6"/>
+                </a:effectRef>
+                <a:fontRef idx="minor">
+                  <a:schemeClr val="dk1"/>
+                </a:fontRef>
+              </p:style>
+              <p:txBody>
+                <a:bodyPr rtlCol="0" anchor="ctr"/>
+                <a:lstStyle/>
+                <a:p>
+                  <a:pPr algn="ctr"/>
+                  <a14:m>
+                    <m:oMathPara xmlns:m="http://schemas.openxmlformats.org/officeDocument/2006/math">
+                      <m:oMathParaPr>
+                        <m:jc m:val="centerGroup"/>
+                      </m:oMathParaPr>
+                      <m:oMath xmlns:m="http://schemas.openxmlformats.org/officeDocument/2006/math">
+                        <m:sSub>
+                          <m:sSubPr>
+                            <m:ctrlPr>
+                              <a:rPr lang="en-US" b="0" i="1" smtClean="0">
+                                <a:latin typeface="Cambria Math" panose="02040503050406030204" pitchFamily="18" charset="0"/>
+                              </a:rPr>
+                            </m:ctrlPr>
+                          </m:sSubPr>
+                          <m:e>
+                            <m:r>
+                              <a:rPr lang="en-US" b="0" i="1" smtClean="0">
+                                <a:latin typeface="Cambria Math" panose="02040503050406030204" pitchFamily="18" charset="0"/>
+                              </a:rPr>
+                              <m:t>𝐼</m:t>
+                            </m:r>
+                          </m:e>
+                          <m:sub>
+                            <m:r>
+                              <a:rPr lang="en-US" b="0" i="1" smtClean="0">
+                                <a:latin typeface="Cambria Math" panose="02040503050406030204" pitchFamily="18" charset="0"/>
+                              </a:rPr>
+                              <m:t>𝑠</m:t>
+                            </m:r>
+                            <m:r>
+                              <a:rPr lang="en-US" b="0" i="1" smtClean="0">
+                                <a:latin typeface="Cambria Math" panose="02040503050406030204" pitchFamily="18" charset="0"/>
+                              </a:rPr>
+                              <m:t>, 2</m:t>
+                            </m:r>
+                          </m:sub>
+                        </m:sSub>
+                      </m:oMath>
+                    </m:oMathPara>
+                  </a14:m>
+                  <a:endParaRPr lang="en-US" dirty="0"/>
+                </a:p>
+              </p:txBody>
+            </p:sp>
+          </mc:Choice>
+          <mc:Fallback>
+            <p:sp>
+              <p:nvSpPr>
+                <p:cNvPr id="8" name="Oval 7">
+                  <a:extLst>
+                    <a:ext uri="{FF2B5EF4-FFF2-40B4-BE49-F238E27FC236}">
+                      <a16:creationId xmlns:a16="http://schemas.microsoft.com/office/drawing/2014/main" id="{B9B980E0-E63A-B341-A7A7-E0F2049BE7FD}"/>
+                    </a:ext>
+                  </a:extLst>
+                </p:cNvPr>
+                <p:cNvSpPr>
+                  <a:spLocks noRot="1" noChangeAspect="1" noMove="1" noResize="1" noEditPoints="1" noAdjustHandles="1" noChangeArrowheads="1" noChangeShapeType="1" noTextEdit="1"/>
+                </p:cNvSpPr>
+                <p:nvPr/>
+              </p:nvSpPr>
+              <p:spPr>
+                <a:xfrm>
+                  <a:off x="3984727" y="4251337"/>
+                  <a:ext cx="645253" cy="645252"/>
+                </a:xfrm>
+                <a:prstGeom prst="ellipse">
+                  <a:avLst/>
+                </a:prstGeom>
+                <a:blipFill>
+                  <a:blip r:embed="rId6"/>
+                  <a:stretch>
+                    <a:fillRect/>
+                  </a:stretch>
+                </a:blipFill>
+                <a:ln>
+                  <a:solidFill>
+                    <a:schemeClr val="tx1"/>
+                  </a:solidFill>
+                </a:ln>
+              </p:spPr>
+              <p:txBody>
+                <a:bodyPr/>
+                <a:lstStyle/>
+                <a:p>
+                  <a:r>
+                    <a:rPr lang="en-US">
+                      <a:noFill/>
+                    </a:rPr>
+                    <a:t> </a:t>
+                  </a:r>
+                </a:p>
+              </p:txBody>
+            </p:sp>
+          </mc:Fallback>
+        </mc:AlternateContent>
+        <mc:AlternateContent xmlns:mc="http://schemas.openxmlformats.org/markup-compatibility/2006">
+          <mc:Choice xmlns:a14="http://schemas.microsoft.com/office/drawing/2010/main" Requires="a14">
+            <p:sp>
+              <p:nvSpPr>
+                <p:cNvPr id="9" name="Oval 8">
+                  <a:extLst>
+                    <a:ext uri="{FF2B5EF4-FFF2-40B4-BE49-F238E27FC236}">
+                      <a16:creationId xmlns:a16="http://schemas.microsoft.com/office/drawing/2014/main" id="{2F113C0C-34B0-0F4A-85FE-28B1DCB1928A}"/>
+                    </a:ext>
+                  </a:extLst>
+                </p:cNvPr>
+                <p:cNvSpPr/>
+                <p:nvPr/>
+              </p:nvSpPr>
+              <p:spPr>
+                <a:xfrm>
+                  <a:off x="5417287" y="1569097"/>
+                  <a:ext cx="645253" cy="645252"/>
+                </a:xfrm>
+                <a:prstGeom prst="ellipse">
+                  <a:avLst/>
+                </a:prstGeom>
+                <a:ln>
+                  <a:solidFill>
+                    <a:schemeClr val="tx1"/>
+                  </a:solidFill>
+                </a:ln>
+              </p:spPr>
+              <p:style>
+                <a:lnRef idx="2">
+                  <a:schemeClr val="accent6"/>
+                </a:lnRef>
+                <a:fillRef idx="1">
+                  <a:schemeClr val="lt1"/>
+                </a:fillRef>
+                <a:effectRef idx="0">
+                  <a:schemeClr val="accent6"/>
+                </a:effectRef>
+                <a:fontRef idx="minor">
+                  <a:schemeClr val="dk1"/>
+                </a:fontRef>
+              </p:style>
+              <p:txBody>
+                <a:bodyPr rtlCol="0" anchor="ctr"/>
+                <a:lstStyle/>
+                <a:p>
+                  <a:pPr algn="ctr"/>
+                  <a14:m>
+                    <m:oMathPara xmlns:m="http://schemas.openxmlformats.org/officeDocument/2006/math">
+                      <m:oMathParaPr>
+                        <m:jc m:val="centerGroup"/>
+                      </m:oMathParaPr>
+                      <m:oMath xmlns:m="http://schemas.openxmlformats.org/officeDocument/2006/math">
+                        <m:sSub>
+                          <m:sSubPr>
+                            <m:ctrlPr>
+                              <a:rPr lang="en-US" b="0" i="1" smtClean="0">
+                                <a:latin typeface="Cambria Math" panose="02040503050406030204" pitchFamily="18" charset="0"/>
+                              </a:rPr>
+                            </m:ctrlPr>
+                          </m:sSubPr>
+                          <m:e>
+                            <m:r>
+                              <a:rPr lang="en-US" b="0" i="1" smtClean="0">
+                                <a:latin typeface="Cambria Math" panose="02040503050406030204" pitchFamily="18" charset="0"/>
+                              </a:rPr>
+                              <m:t>𝐼</m:t>
+                            </m:r>
+                          </m:e>
+                          <m:sub>
+                            <m:r>
+                              <a:rPr lang="en-US" b="0" i="1" smtClean="0">
+                                <a:latin typeface="Cambria Math" panose="02040503050406030204" pitchFamily="18" charset="0"/>
+                              </a:rPr>
+                              <m:t>𝑑</m:t>
+                            </m:r>
+                            <m:r>
+                              <a:rPr lang="en-US" b="0" i="1" smtClean="0">
+                                <a:latin typeface="Cambria Math" panose="02040503050406030204" pitchFamily="18" charset="0"/>
+                              </a:rPr>
+                              <m:t>, 0</m:t>
+                            </m:r>
+                          </m:sub>
+                        </m:sSub>
+                      </m:oMath>
+                    </m:oMathPara>
+                  </a14:m>
+                  <a:endParaRPr lang="en-US" dirty="0"/>
+                </a:p>
+              </p:txBody>
+            </p:sp>
+          </mc:Choice>
+          <mc:Fallback>
+            <p:sp>
+              <p:nvSpPr>
+                <p:cNvPr id="9" name="Oval 8">
+                  <a:extLst>
+                    <a:ext uri="{FF2B5EF4-FFF2-40B4-BE49-F238E27FC236}">
+                      <a16:creationId xmlns:a16="http://schemas.microsoft.com/office/drawing/2014/main" id="{2F113C0C-34B0-0F4A-85FE-28B1DCB1928A}"/>
+                    </a:ext>
+                  </a:extLst>
+                </p:cNvPr>
+                <p:cNvSpPr>
+                  <a:spLocks noRot="1" noChangeAspect="1" noMove="1" noResize="1" noEditPoints="1" noAdjustHandles="1" noChangeArrowheads="1" noChangeShapeType="1" noTextEdit="1"/>
+                </p:cNvSpPr>
+                <p:nvPr/>
+              </p:nvSpPr>
+              <p:spPr>
+                <a:xfrm>
+                  <a:off x="5417287" y="1569097"/>
+                  <a:ext cx="645253" cy="645252"/>
+                </a:xfrm>
+                <a:prstGeom prst="ellipse">
+                  <a:avLst/>
+                </a:prstGeom>
+                <a:blipFill>
+                  <a:blip r:embed="rId7"/>
+                  <a:stretch>
+                    <a:fillRect/>
+                  </a:stretch>
+                </a:blipFill>
+                <a:ln>
+                  <a:solidFill>
+                    <a:schemeClr val="tx1"/>
+                  </a:solidFill>
+                </a:ln>
+              </p:spPr>
+              <p:txBody>
+                <a:bodyPr/>
+                <a:lstStyle/>
+                <a:p>
+                  <a:r>
+                    <a:rPr lang="en-US">
+                      <a:noFill/>
+                    </a:rPr>
+                    <a:t> </a:t>
+                  </a:r>
+                </a:p>
+              </p:txBody>
+            </p:sp>
+          </mc:Fallback>
+        </mc:AlternateContent>
+        <mc:AlternateContent xmlns:mc="http://schemas.openxmlformats.org/markup-compatibility/2006">
+          <mc:Choice xmlns:a14="http://schemas.microsoft.com/office/drawing/2010/main" Requires="a14">
+            <p:sp>
+              <p:nvSpPr>
+                <p:cNvPr id="10" name="Oval 9">
+                  <a:extLst>
+                    <a:ext uri="{FF2B5EF4-FFF2-40B4-BE49-F238E27FC236}">
+                      <a16:creationId xmlns:a16="http://schemas.microsoft.com/office/drawing/2014/main" id="{F220B1DF-A023-5044-8963-D7C06D821950}"/>
+                    </a:ext>
+                  </a:extLst>
+                </p:cNvPr>
+                <p:cNvSpPr/>
+                <p:nvPr/>
+              </p:nvSpPr>
+              <p:spPr>
+                <a:xfrm>
+                  <a:off x="5417286" y="2910217"/>
+                  <a:ext cx="645253" cy="645252"/>
+                </a:xfrm>
+                <a:prstGeom prst="ellipse">
+                  <a:avLst/>
+                </a:prstGeom>
+                <a:ln>
+                  <a:solidFill>
+                    <a:schemeClr val="tx1"/>
+                  </a:solidFill>
+                </a:ln>
+              </p:spPr>
+              <p:style>
+                <a:lnRef idx="2">
+                  <a:schemeClr val="accent6"/>
+                </a:lnRef>
+                <a:fillRef idx="1">
+                  <a:schemeClr val="lt1"/>
+                </a:fillRef>
+                <a:effectRef idx="0">
+                  <a:schemeClr val="accent6"/>
+                </a:effectRef>
+                <a:fontRef idx="minor">
+                  <a:schemeClr val="dk1"/>
+                </a:fontRef>
+              </p:style>
+              <p:txBody>
+                <a:bodyPr rtlCol="0" anchor="ctr"/>
+                <a:lstStyle/>
+                <a:p>
+                  <a:pPr algn="ctr"/>
+                  <a14:m>
+                    <m:oMathPara xmlns:m="http://schemas.openxmlformats.org/officeDocument/2006/math">
+                      <m:oMathParaPr>
+                        <m:jc m:val="centerGroup"/>
+                      </m:oMathParaPr>
+                      <m:oMath xmlns:m="http://schemas.openxmlformats.org/officeDocument/2006/math">
+                        <m:sSub>
+                          <m:sSubPr>
+                            <m:ctrlPr>
+                              <a:rPr lang="en-US" b="0" i="1" smtClean="0">
+                                <a:latin typeface="Cambria Math" panose="02040503050406030204" pitchFamily="18" charset="0"/>
+                              </a:rPr>
+                            </m:ctrlPr>
+                          </m:sSubPr>
+                          <m:e>
+                            <m:r>
+                              <a:rPr lang="en-US" b="0" i="1" smtClean="0">
+                                <a:latin typeface="Cambria Math" panose="02040503050406030204" pitchFamily="18" charset="0"/>
+                              </a:rPr>
+                              <m:t>𝐼</m:t>
+                            </m:r>
+                          </m:e>
+                          <m:sub>
+                            <m:r>
+                              <a:rPr lang="en-US" b="0" i="1" smtClean="0">
+                                <a:latin typeface="Cambria Math" panose="02040503050406030204" pitchFamily="18" charset="0"/>
+                              </a:rPr>
+                              <m:t>𝑑</m:t>
+                            </m:r>
+                            <m:r>
+                              <a:rPr lang="en-US" b="0" i="1" smtClean="0">
+                                <a:latin typeface="Cambria Math" panose="02040503050406030204" pitchFamily="18" charset="0"/>
+                              </a:rPr>
+                              <m:t>,1</m:t>
+                            </m:r>
+                          </m:sub>
+                        </m:sSub>
+                      </m:oMath>
+                    </m:oMathPara>
+                  </a14:m>
+                  <a:endParaRPr lang="en-US" dirty="0"/>
+                </a:p>
+              </p:txBody>
+            </p:sp>
+          </mc:Choice>
+          <mc:Fallback>
+            <p:sp>
+              <p:nvSpPr>
+                <p:cNvPr id="10" name="Oval 9">
+                  <a:extLst>
+                    <a:ext uri="{FF2B5EF4-FFF2-40B4-BE49-F238E27FC236}">
+                      <a16:creationId xmlns:a16="http://schemas.microsoft.com/office/drawing/2014/main" id="{F220B1DF-A023-5044-8963-D7C06D821950}"/>
+                    </a:ext>
+                  </a:extLst>
+                </p:cNvPr>
+                <p:cNvSpPr>
+                  <a:spLocks noRot="1" noChangeAspect="1" noMove="1" noResize="1" noEditPoints="1" noAdjustHandles="1" noChangeArrowheads="1" noChangeShapeType="1" noTextEdit="1"/>
+                </p:cNvSpPr>
+                <p:nvPr/>
+              </p:nvSpPr>
+              <p:spPr>
+                <a:xfrm>
+                  <a:off x="5417286" y="2910217"/>
+                  <a:ext cx="645253" cy="645252"/>
+                </a:xfrm>
+                <a:prstGeom prst="ellipse">
+                  <a:avLst/>
+                </a:prstGeom>
+                <a:blipFill>
+                  <a:blip r:embed="rId8"/>
+                  <a:stretch>
+                    <a:fillRect/>
+                  </a:stretch>
+                </a:blipFill>
+                <a:ln>
+                  <a:solidFill>
+                    <a:schemeClr val="tx1"/>
+                  </a:solidFill>
+                </a:ln>
+              </p:spPr>
+              <p:txBody>
+                <a:bodyPr/>
+                <a:lstStyle/>
+                <a:p>
+                  <a:r>
+                    <a:rPr lang="en-US">
+                      <a:noFill/>
+                    </a:rPr>
+                    <a:t> </a:t>
+                  </a:r>
+                </a:p>
+              </p:txBody>
+            </p:sp>
+          </mc:Fallback>
+        </mc:AlternateContent>
+        <mc:AlternateContent xmlns:mc="http://schemas.openxmlformats.org/markup-compatibility/2006">
+          <mc:Choice xmlns:a14="http://schemas.microsoft.com/office/drawing/2010/main" Requires="a14">
+            <p:sp>
+              <p:nvSpPr>
+                <p:cNvPr id="11" name="Oval 10">
+                  <a:extLst>
+                    <a:ext uri="{FF2B5EF4-FFF2-40B4-BE49-F238E27FC236}">
+                      <a16:creationId xmlns:a16="http://schemas.microsoft.com/office/drawing/2014/main" id="{C9AE5691-99A9-3A49-8A46-58E80305EC5F}"/>
+                    </a:ext>
+                  </a:extLst>
+                </p:cNvPr>
+                <p:cNvSpPr/>
+                <p:nvPr/>
+              </p:nvSpPr>
+              <p:spPr>
+                <a:xfrm>
+                  <a:off x="5417285" y="4251337"/>
+                  <a:ext cx="645253" cy="645252"/>
+                </a:xfrm>
+                <a:prstGeom prst="ellipse">
+                  <a:avLst/>
+                </a:prstGeom>
+                <a:ln>
+                  <a:solidFill>
+                    <a:schemeClr val="tx1"/>
+                  </a:solidFill>
+                </a:ln>
+              </p:spPr>
+              <p:style>
+                <a:lnRef idx="2">
+                  <a:schemeClr val="accent6"/>
+                </a:lnRef>
+                <a:fillRef idx="1">
+                  <a:schemeClr val="lt1"/>
+                </a:fillRef>
+                <a:effectRef idx="0">
+                  <a:schemeClr val="accent6"/>
+                </a:effectRef>
+                <a:fontRef idx="minor">
+                  <a:schemeClr val="dk1"/>
+                </a:fontRef>
+              </p:style>
+              <p:txBody>
+                <a:bodyPr rtlCol="0" anchor="ctr"/>
+                <a:lstStyle/>
+                <a:p>
+                  <a:pPr algn="ctr"/>
+                  <a14:m>
+                    <m:oMathPara xmlns:m="http://schemas.openxmlformats.org/officeDocument/2006/math">
+                      <m:oMathParaPr>
+                        <m:jc m:val="centerGroup"/>
+                      </m:oMathParaPr>
+                      <m:oMath xmlns:m="http://schemas.openxmlformats.org/officeDocument/2006/math">
+                        <m:sSub>
+                          <m:sSubPr>
+                            <m:ctrlPr>
+                              <a:rPr lang="en-US" b="0" i="1" smtClean="0">
+                                <a:latin typeface="Cambria Math" panose="02040503050406030204" pitchFamily="18" charset="0"/>
+                              </a:rPr>
+                            </m:ctrlPr>
+                          </m:sSubPr>
+                          <m:e>
+                            <m:r>
+                              <a:rPr lang="en-US" b="0" i="1" smtClean="0">
+                                <a:latin typeface="Cambria Math" panose="02040503050406030204" pitchFamily="18" charset="0"/>
+                              </a:rPr>
+                              <m:t>𝐼</m:t>
+                            </m:r>
+                          </m:e>
+                          <m:sub>
+                            <m:r>
+                              <a:rPr lang="en-US" b="0" i="1" smtClean="0">
+                                <a:latin typeface="Cambria Math" panose="02040503050406030204" pitchFamily="18" charset="0"/>
+                              </a:rPr>
+                              <m:t>𝑑</m:t>
+                            </m:r>
+                            <m:r>
+                              <a:rPr lang="en-US" b="0" i="1" smtClean="0">
+                                <a:latin typeface="Cambria Math" panose="02040503050406030204" pitchFamily="18" charset="0"/>
+                              </a:rPr>
+                              <m:t> 2</m:t>
+                            </m:r>
+                          </m:sub>
+                        </m:sSub>
+                      </m:oMath>
+                    </m:oMathPara>
+                  </a14:m>
+                  <a:endParaRPr lang="en-US" dirty="0"/>
+                </a:p>
+              </p:txBody>
+            </p:sp>
+          </mc:Choice>
+          <mc:Fallback>
+            <p:sp>
+              <p:nvSpPr>
+                <p:cNvPr id="11" name="Oval 10">
+                  <a:extLst>
+                    <a:ext uri="{FF2B5EF4-FFF2-40B4-BE49-F238E27FC236}">
+                      <a16:creationId xmlns:a16="http://schemas.microsoft.com/office/drawing/2014/main" id="{C9AE5691-99A9-3A49-8A46-58E80305EC5F}"/>
+                    </a:ext>
+                  </a:extLst>
+                </p:cNvPr>
+                <p:cNvSpPr>
+                  <a:spLocks noRot="1" noChangeAspect="1" noMove="1" noResize="1" noEditPoints="1" noAdjustHandles="1" noChangeArrowheads="1" noChangeShapeType="1" noTextEdit="1"/>
+                </p:cNvSpPr>
+                <p:nvPr/>
+              </p:nvSpPr>
+              <p:spPr>
+                <a:xfrm>
+                  <a:off x="5417285" y="4251337"/>
+                  <a:ext cx="645253" cy="645252"/>
+                </a:xfrm>
+                <a:prstGeom prst="ellipse">
+                  <a:avLst/>
+                </a:prstGeom>
+                <a:blipFill>
+                  <a:blip r:embed="rId9"/>
+                  <a:stretch>
+                    <a:fillRect/>
+                  </a:stretch>
+                </a:blipFill>
+                <a:ln>
+                  <a:solidFill>
+                    <a:schemeClr val="tx1"/>
+                  </a:solidFill>
+                </a:ln>
+              </p:spPr>
+              <p:txBody>
+                <a:bodyPr/>
+                <a:lstStyle/>
+                <a:p>
+                  <a:r>
+                    <a:rPr lang="en-US">
+                      <a:noFill/>
+                    </a:rPr>
+                    <a:t> </a:t>
+                  </a:r>
+                </a:p>
+              </p:txBody>
+            </p:sp>
+          </mc:Fallback>
+        </mc:AlternateContent>
+        <mc:AlternateContent xmlns:mc="http://schemas.openxmlformats.org/markup-compatibility/2006">
+          <mc:Choice xmlns:a14="http://schemas.microsoft.com/office/drawing/2010/main" Requires="a14">
+            <p:sp>
+              <p:nvSpPr>
+                <p:cNvPr id="12" name="Oval 11">
+                  <a:extLst>
+                    <a:ext uri="{FF2B5EF4-FFF2-40B4-BE49-F238E27FC236}">
+                      <a16:creationId xmlns:a16="http://schemas.microsoft.com/office/drawing/2014/main" id="{D6D18AA8-D61C-A94A-BB49-DD6D27914E7E}"/>
+                    </a:ext>
+                  </a:extLst>
+                </p:cNvPr>
+                <p:cNvSpPr/>
+                <p:nvPr/>
+              </p:nvSpPr>
+              <p:spPr>
+                <a:xfrm>
+                  <a:off x="6849843" y="1569097"/>
+                  <a:ext cx="645253" cy="645252"/>
+                </a:xfrm>
+                <a:prstGeom prst="ellipse">
+                  <a:avLst/>
+                </a:prstGeom>
+                <a:ln>
+                  <a:solidFill>
+                    <a:schemeClr val="tx1"/>
+                  </a:solidFill>
+                </a:ln>
+              </p:spPr>
+              <p:style>
+                <a:lnRef idx="2">
+                  <a:schemeClr val="accent6"/>
+                </a:lnRef>
+                <a:fillRef idx="1">
+                  <a:schemeClr val="lt1"/>
+                </a:fillRef>
+                <a:effectRef idx="0">
+                  <a:schemeClr val="accent6"/>
+                </a:effectRef>
+                <a:fontRef idx="minor">
+                  <a:schemeClr val="dk1"/>
+                </a:fontRef>
+              </p:style>
+              <p:txBody>
+                <a:bodyPr rtlCol="0" anchor="ctr"/>
+                <a:lstStyle/>
+                <a:p>
+                  <a:pPr algn="ctr"/>
+                  <a14:m>
+                    <m:oMathPara xmlns:m="http://schemas.openxmlformats.org/officeDocument/2006/math">
+                      <m:oMathParaPr>
+                        <m:jc m:val="centerGroup"/>
+                      </m:oMathParaPr>
+                      <m:oMath xmlns:m="http://schemas.openxmlformats.org/officeDocument/2006/math">
+                        <m:sSub>
+                          <m:sSubPr>
+                            <m:ctrlPr>
+                              <a:rPr lang="en-US" b="0" i="1" smtClean="0">
+                                <a:latin typeface="Cambria Math" panose="02040503050406030204" pitchFamily="18" charset="0"/>
+                              </a:rPr>
+                            </m:ctrlPr>
+                          </m:sSubPr>
+                          <m:e>
+                            <m:r>
+                              <a:rPr lang="en-US" b="0" i="1" smtClean="0">
+                                <a:latin typeface="Cambria Math" panose="02040503050406030204" pitchFamily="18" charset="0"/>
+                              </a:rPr>
+                              <m:t>𝐻</m:t>
+                            </m:r>
+                          </m:e>
+                          <m:sub>
+                            <m:r>
+                              <a:rPr lang="en-US" b="0" i="1" smtClean="0">
+                                <a:latin typeface="Cambria Math" panose="02040503050406030204" pitchFamily="18" charset="0"/>
+                              </a:rPr>
+                              <m:t>0</m:t>
+                            </m:r>
+                          </m:sub>
+                        </m:sSub>
+                      </m:oMath>
+                    </m:oMathPara>
+                  </a14:m>
+                  <a:endParaRPr lang="en-US" dirty="0"/>
+                </a:p>
+              </p:txBody>
+            </p:sp>
+          </mc:Choice>
+          <mc:Fallback>
+            <p:sp>
+              <p:nvSpPr>
+                <p:cNvPr id="12" name="Oval 11">
+                  <a:extLst>
+                    <a:ext uri="{FF2B5EF4-FFF2-40B4-BE49-F238E27FC236}">
+                      <a16:creationId xmlns:a16="http://schemas.microsoft.com/office/drawing/2014/main" id="{D6D18AA8-D61C-A94A-BB49-DD6D27914E7E}"/>
+                    </a:ext>
+                  </a:extLst>
+                </p:cNvPr>
+                <p:cNvSpPr>
+                  <a:spLocks noRot="1" noChangeAspect="1" noMove="1" noResize="1" noEditPoints="1" noAdjustHandles="1" noChangeArrowheads="1" noChangeShapeType="1" noTextEdit="1"/>
+                </p:cNvSpPr>
+                <p:nvPr/>
+              </p:nvSpPr>
+              <p:spPr>
+                <a:xfrm>
+                  <a:off x="6849843" y="1569097"/>
+                  <a:ext cx="645253" cy="645252"/>
+                </a:xfrm>
+                <a:prstGeom prst="ellipse">
+                  <a:avLst/>
+                </a:prstGeom>
+                <a:blipFill>
+                  <a:blip r:embed="rId10"/>
+                  <a:stretch>
+                    <a:fillRect/>
+                  </a:stretch>
+                </a:blipFill>
+                <a:ln>
+                  <a:solidFill>
+                    <a:schemeClr val="tx1"/>
+                  </a:solidFill>
+                </a:ln>
+              </p:spPr>
+              <p:txBody>
+                <a:bodyPr/>
+                <a:lstStyle/>
+                <a:p>
+                  <a:r>
+                    <a:rPr lang="en-US">
+                      <a:noFill/>
+                    </a:rPr>
+                    <a:t> </a:t>
+                  </a:r>
+                </a:p>
+              </p:txBody>
+            </p:sp>
+          </mc:Fallback>
+        </mc:AlternateContent>
+        <mc:AlternateContent xmlns:mc="http://schemas.openxmlformats.org/markup-compatibility/2006">
+          <mc:Choice xmlns:a14="http://schemas.microsoft.com/office/drawing/2010/main" Requires="a14">
+            <p:sp>
+              <p:nvSpPr>
+                <p:cNvPr id="13" name="Oval 12">
+                  <a:extLst>
+                    <a:ext uri="{FF2B5EF4-FFF2-40B4-BE49-F238E27FC236}">
+                      <a16:creationId xmlns:a16="http://schemas.microsoft.com/office/drawing/2014/main" id="{65866F9E-7476-804F-A236-CA8B44FD890F}"/>
+                    </a:ext>
+                  </a:extLst>
+                </p:cNvPr>
+                <p:cNvSpPr/>
+                <p:nvPr/>
+              </p:nvSpPr>
+              <p:spPr>
+                <a:xfrm>
+                  <a:off x="6849842" y="2910217"/>
+                  <a:ext cx="645253" cy="645252"/>
+                </a:xfrm>
+                <a:prstGeom prst="ellipse">
+                  <a:avLst/>
+                </a:prstGeom>
+                <a:ln>
+                  <a:solidFill>
+                    <a:schemeClr val="tx1"/>
+                  </a:solidFill>
+                </a:ln>
+              </p:spPr>
+              <p:style>
+                <a:lnRef idx="2">
+                  <a:schemeClr val="accent6"/>
+                </a:lnRef>
+                <a:fillRef idx="1">
+                  <a:schemeClr val="lt1"/>
+                </a:fillRef>
+                <a:effectRef idx="0">
+                  <a:schemeClr val="accent6"/>
+                </a:effectRef>
+                <a:fontRef idx="minor">
+                  <a:schemeClr val="dk1"/>
+                </a:fontRef>
+              </p:style>
+              <p:txBody>
+                <a:bodyPr rtlCol="0" anchor="ctr"/>
+                <a:lstStyle/>
+                <a:p>
+                  <a:pPr algn="ctr"/>
+                  <a14:m>
+                    <m:oMathPara xmlns:m="http://schemas.openxmlformats.org/officeDocument/2006/math">
+                      <m:oMathParaPr>
+                        <m:jc m:val="centerGroup"/>
+                      </m:oMathParaPr>
+                      <m:oMath xmlns:m="http://schemas.openxmlformats.org/officeDocument/2006/math">
+                        <m:sSub>
+                          <m:sSubPr>
+                            <m:ctrlPr>
+                              <a:rPr lang="en-US" b="0" i="1" smtClean="0">
+                                <a:latin typeface="Cambria Math" panose="02040503050406030204" pitchFamily="18" charset="0"/>
+                              </a:rPr>
+                            </m:ctrlPr>
+                          </m:sSubPr>
+                          <m:e>
+                            <m:r>
+                              <a:rPr lang="en-US" b="0" i="1" smtClean="0">
+                                <a:latin typeface="Cambria Math" panose="02040503050406030204" pitchFamily="18" charset="0"/>
+                              </a:rPr>
+                              <m:t>𝐻</m:t>
+                            </m:r>
+                          </m:e>
+                          <m:sub>
+                            <m:r>
+                              <a:rPr lang="en-US" b="0" i="1" smtClean="0">
+                                <a:latin typeface="Cambria Math" panose="02040503050406030204" pitchFamily="18" charset="0"/>
+                              </a:rPr>
+                              <m:t>1</m:t>
+                            </m:r>
+                          </m:sub>
+                        </m:sSub>
+                      </m:oMath>
+                    </m:oMathPara>
+                  </a14:m>
+                  <a:endParaRPr lang="en-US" dirty="0"/>
+                </a:p>
+              </p:txBody>
+            </p:sp>
+          </mc:Choice>
+          <mc:Fallback>
+            <p:sp>
+              <p:nvSpPr>
+                <p:cNvPr id="13" name="Oval 12">
+                  <a:extLst>
+                    <a:ext uri="{FF2B5EF4-FFF2-40B4-BE49-F238E27FC236}">
+                      <a16:creationId xmlns:a16="http://schemas.microsoft.com/office/drawing/2014/main" id="{65866F9E-7476-804F-A236-CA8B44FD890F}"/>
+                    </a:ext>
+                  </a:extLst>
+                </p:cNvPr>
+                <p:cNvSpPr>
+                  <a:spLocks noRot="1" noChangeAspect="1" noMove="1" noResize="1" noEditPoints="1" noAdjustHandles="1" noChangeArrowheads="1" noChangeShapeType="1" noTextEdit="1"/>
+                </p:cNvSpPr>
+                <p:nvPr/>
+              </p:nvSpPr>
+              <p:spPr>
+                <a:xfrm>
+                  <a:off x="6849842" y="2910217"/>
+                  <a:ext cx="645253" cy="645252"/>
+                </a:xfrm>
+                <a:prstGeom prst="ellipse">
+                  <a:avLst/>
+                </a:prstGeom>
+                <a:blipFill>
+                  <a:blip r:embed="rId11"/>
+                  <a:stretch>
+                    <a:fillRect/>
+                  </a:stretch>
+                </a:blipFill>
+                <a:ln>
+                  <a:solidFill>
+                    <a:schemeClr val="tx1"/>
+                  </a:solidFill>
+                </a:ln>
+              </p:spPr>
+              <p:txBody>
+                <a:bodyPr/>
+                <a:lstStyle/>
+                <a:p>
+                  <a:r>
+                    <a:rPr lang="en-US">
+                      <a:noFill/>
+                    </a:rPr>
+                    <a:t> </a:t>
+                  </a:r>
+                </a:p>
+              </p:txBody>
+            </p:sp>
+          </mc:Fallback>
+        </mc:AlternateContent>
+        <mc:AlternateContent xmlns:mc="http://schemas.openxmlformats.org/markup-compatibility/2006">
+          <mc:Choice xmlns:a14="http://schemas.microsoft.com/office/drawing/2010/main" Requires="a14">
+            <p:sp>
+              <p:nvSpPr>
+                <p:cNvPr id="14" name="Oval 13">
+                  <a:extLst>
+                    <a:ext uri="{FF2B5EF4-FFF2-40B4-BE49-F238E27FC236}">
+                      <a16:creationId xmlns:a16="http://schemas.microsoft.com/office/drawing/2014/main" id="{438622A3-D702-D346-AA7A-6CD2FE790E96}"/>
+                    </a:ext>
+                  </a:extLst>
+                </p:cNvPr>
+                <p:cNvSpPr/>
+                <p:nvPr/>
+              </p:nvSpPr>
+              <p:spPr>
+                <a:xfrm>
+                  <a:off x="6849841" y="4251337"/>
+                  <a:ext cx="645253" cy="645252"/>
+                </a:xfrm>
+                <a:prstGeom prst="ellipse">
+                  <a:avLst/>
+                </a:prstGeom>
+                <a:ln>
+                  <a:solidFill>
+                    <a:schemeClr val="tx1"/>
+                  </a:solidFill>
+                </a:ln>
+              </p:spPr>
+              <p:style>
+                <a:lnRef idx="2">
+                  <a:schemeClr val="accent6"/>
+                </a:lnRef>
+                <a:fillRef idx="1">
+                  <a:schemeClr val="lt1"/>
+                </a:fillRef>
+                <a:effectRef idx="0">
+                  <a:schemeClr val="accent6"/>
+                </a:effectRef>
+                <a:fontRef idx="minor">
+                  <a:schemeClr val="dk1"/>
+                </a:fontRef>
+              </p:style>
+              <p:txBody>
+                <a:bodyPr rtlCol="0" anchor="ctr"/>
+                <a:lstStyle/>
+                <a:p>
+                  <a:pPr algn="ctr"/>
+                  <a14:m>
+                    <m:oMathPara xmlns:m="http://schemas.openxmlformats.org/officeDocument/2006/math">
+                      <m:oMathParaPr>
+                        <m:jc m:val="centerGroup"/>
+                      </m:oMathParaPr>
+                      <m:oMath xmlns:m="http://schemas.openxmlformats.org/officeDocument/2006/math">
+                        <m:sSub>
+                          <m:sSubPr>
+                            <m:ctrlPr>
+                              <a:rPr lang="en-US" b="0" i="1" smtClean="0">
+                                <a:latin typeface="Cambria Math" panose="02040503050406030204" pitchFamily="18" charset="0"/>
+                              </a:rPr>
+                            </m:ctrlPr>
+                          </m:sSubPr>
+                          <m:e>
+                            <m:r>
+                              <a:rPr lang="en-US" b="0" i="1" smtClean="0">
+                                <a:latin typeface="Cambria Math" panose="02040503050406030204" pitchFamily="18" charset="0"/>
+                              </a:rPr>
+                              <m:t>𝐻</m:t>
+                            </m:r>
+                          </m:e>
+                          <m:sub>
+                            <m:r>
+                              <a:rPr lang="en-US" b="0" i="1" smtClean="0">
+                                <a:latin typeface="Cambria Math" panose="02040503050406030204" pitchFamily="18" charset="0"/>
+                              </a:rPr>
+                              <m:t>2</m:t>
+                            </m:r>
+                          </m:sub>
+                        </m:sSub>
+                      </m:oMath>
+                    </m:oMathPara>
+                  </a14:m>
+                  <a:endParaRPr lang="en-US" dirty="0"/>
+                </a:p>
+              </p:txBody>
+            </p:sp>
+          </mc:Choice>
+          <mc:Fallback>
+            <p:sp>
+              <p:nvSpPr>
+                <p:cNvPr id="14" name="Oval 13">
+                  <a:extLst>
+                    <a:ext uri="{FF2B5EF4-FFF2-40B4-BE49-F238E27FC236}">
+                      <a16:creationId xmlns:a16="http://schemas.microsoft.com/office/drawing/2014/main" id="{438622A3-D702-D346-AA7A-6CD2FE790E96}"/>
+                    </a:ext>
+                  </a:extLst>
+                </p:cNvPr>
+                <p:cNvSpPr>
+                  <a:spLocks noRot="1" noChangeAspect="1" noMove="1" noResize="1" noEditPoints="1" noAdjustHandles="1" noChangeArrowheads="1" noChangeShapeType="1" noTextEdit="1"/>
+                </p:cNvSpPr>
+                <p:nvPr/>
+              </p:nvSpPr>
+              <p:spPr>
+                <a:xfrm>
+                  <a:off x="6849841" y="4251337"/>
+                  <a:ext cx="645253" cy="645252"/>
+                </a:xfrm>
+                <a:prstGeom prst="ellipse">
+                  <a:avLst/>
+                </a:prstGeom>
+                <a:blipFill>
+                  <a:blip r:embed="rId12"/>
+                  <a:stretch>
+                    <a:fillRect/>
+                  </a:stretch>
+                </a:blipFill>
+                <a:ln>
+                  <a:solidFill>
+                    <a:schemeClr val="tx1"/>
+                  </a:solidFill>
+                </a:ln>
+              </p:spPr>
+              <p:txBody>
+                <a:bodyPr/>
+                <a:lstStyle/>
+                <a:p>
+                  <a:r>
+                    <a:rPr lang="en-US">
+                      <a:noFill/>
+                    </a:rPr>
+                    <a:t> </a:t>
+                  </a:r>
+                </a:p>
+              </p:txBody>
+            </p:sp>
+          </mc:Fallback>
+        </mc:AlternateContent>
+        <mc:AlternateContent xmlns:mc="http://schemas.openxmlformats.org/markup-compatibility/2006">
+          <mc:Choice xmlns:a14="http://schemas.microsoft.com/office/drawing/2010/main" Requires="a14">
+            <p:sp>
+              <p:nvSpPr>
+                <p:cNvPr id="15" name="Rounded Rectangle 14">
+                  <a:extLst>
+                    <a:ext uri="{FF2B5EF4-FFF2-40B4-BE49-F238E27FC236}">
+                      <a16:creationId xmlns:a16="http://schemas.microsoft.com/office/drawing/2014/main" id="{19692BFB-EAA8-C145-918C-2AA1E2303D77}"/>
+                    </a:ext>
+                  </a:extLst>
+                </p:cNvPr>
+                <p:cNvSpPr/>
+                <p:nvPr/>
+              </p:nvSpPr>
+              <p:spPr>
+                <a:xfrm>
+                  <a:off x="8282397" y="1569097"/>
+                  <a:ext cx="1310109" cy="3327492"/>
+                </a:xfrm>
+                <a:prstGeom prst="roundRect">
+                  <a:avLst/>
+                </a:prstGeom>
+                <a:ln>
+                  <a:solidFill>
+                    <a:schemeClr val="tx1"/>
+                  </a:solidFill>
+                </a:ln>
+              </p:spPr>
+              <p:style>
+                <a:lnRef idx="2">
+                  <a:schemeClr val="accent6"/>
+                </a:lnRef>
+                <a:fillRef idx="1">
+                  <a:schemeClr val="lt1"/>
+                </a:fillRef>
+                <a:effectRef idx="0">
+                  <a:schemeClr val="accent6"/>
+                </a:effectRef>
+                <a:fontRef idx="minor">
+                  <a:schemeClr val="dk1"/>
+                </a:fontRef>
+              </p:style>
+              <p:txBody>
+                <a:bodyPr rtlCol="0" anchor="ctr"/>
+                <a:lstStyle/>
+                <a:p>
+                  <a:pPr algn="ctr"/>
+                  <a14:m>
+                    <m:oMathPara xmlns:m="http://schemas.openxmlformats.org/officeDocument/2006/math">
+                      <m:oMathParaPr>
+                        <m:jc m:val="centerGroup"/>
+                      </m:oMathParaPr>
+                      <m:oMath xmlns:m="http://schemas.openxmlformats.org/officeDocument/2006/math">
+                        <m:r>
+                          <a:rPr lang="en-US" b="0" i="1" smtClean="0">
+                            <a:latin typeface="Cambria Math" panose="02040503050406030204" pitchFamily="18" charset="0"/>
+                          </a:rPr>
+                          <m:t>𝑅</m:t>
+                        </m:r>
+                      </m:oMath>
+                    </m:oMathPara>
+                  </a14:m>
+                  <a:endParaRPr lang="en-US" dirty="0"/>
+                </a:p>
+                <a:p>
+                  <a:pPr algn="ctr"/>
+                  <a:endParaRPr lang="en-US" dirty="0"/>
+                </a:p>
+              </p:txBody>
+            </p:sp>
+          </mc:Choice>
+          <mc:Fallback>
+            <p:sp>
+              <p:nvSpPr>
+                <p:cNvPr id="15" name="Rounded Rectangle 14">
+                  <a:extLst>
+                    <a:ext uri="{FF2B5EF4-FFF2-40B4-BE49-F238E27FC236}">
+                      <a16:creationId xmlns:a16="http://schemas.microsoft.com/office/drawing/2014/main" id="{19692BFB-EAA8-C145-918C-2AA1E2303D77}"/>
+                    </a:ext>
+                  </a:extLst>
+                </p:cNvPr>
+                <p:cNvSpPr>
+                  <a:spLocks noRot="1" noChangeAspect="1" noMove="1" noResize="1" noEditPoints="1" noAdjustHandles="1" noChangeArrowheads="1" noChangeShapeType="1" noTextEdit="1"/>
+                </p:cNvSpPr>
+                <p:nvPr/>
+              </p:nvSpPr>
+              <p:spPr>
+                <a:xfrm>
+                  <a:off x="8282397" y="1569097"/>
+                  <a:ext cx="1310109" cy="3327492"/>
+                </a:xfrm>
+                <a:prstGeom prst="roundRect">
+                  <a:avLst/>
+                </a:prstGeom>
+                <a:blipFill>
+                  <a:blip r:embed="rId13"/>
+                  <a:stretch>
+                    <a:fillRect/>
+                  </a:stretch>
+                </a:blipFill>
+                <a:ln>
+                  <a:solidFill>
+                    <a:schemeClr val="tx1"/>
+                  </a:solidFill>
+                </a:ln>
+              </p:spPr>
+              <p:txBody>
+                <a:bodyPr/>
+                <a:lstStyle/>
+                <a:p>
+                  <a:r>
+                    <a:rPr lang="en-US">
+                      <a:noFill/>
+                    </a:rPr>
+                    <a:t> </a:t>
+                  </a:r>
+                </a:p>
+              </p:txBody>
+            </p:sp>
+          </mc:Fallback>
+        </mc:AlternateContent>
+        <p:cxnSp>
+          <p:nvCxnSpPr>
+            <p:cNvPr id="16" name="Straight Arrow Connector 15">
+              <a:extLst>
+                <a:ext uri="{FF2B5EF4-FFF2-40B4-BE49-F238E27FC236}">
+                  <a16:creationId xmlns:a16="http://schemas.microsoft.com/office/drawing/2014/main" id="{4EE88750-BEC5-AE4C-82CA-5E43C6CA4C59}"/>
+                </a:ext>
+              </a:extLst>
+            </p:cNvPr>
+            <p:cNvCxnSpPr>
+              <a:stCxn id="4" idx="6"/>
+              <a:endCxn id="5" idx="2"/>
+            </p:cNvCxnSpPr>
+            <p:nvPr/>
+          </p:nvCxnSpPr>
+          <p:spPr>
+            <a:xfrm>
+              <a:off x="1764862" y="1891723"/>
+              <a:ext cx="787307" cy="0"/>
+            </a:xfrm>
+            <a:prstGeom prst="straightConnector1">
+              <a:avLst/>
+            </a:prstGeom>
+            <a:ln>
+              <a:tailEnd type="stealth"/>
+            </a:ln>
+          </p:spPr>
+          <p:style>
+            <a:lnRef idx="1">
+              <a:schemeClr val="dk1"/>
+            </a:lnRef>
+            <a:fillRef idx="0">
+              <a:schemeClr val="dk1"/>
+            </a:fillRef>
+            <a:effectRef idx="0">
+              <a:schemeClr val="dk1"/>
+            </a:effectRef>
+            <a:fontRef idx="minor">
+              <a:schemeClr val="tx1"/>
+            </a:fontRef>
+          </p:style>
+        </p:cxnSp>
+        <p:cxnSp>
+          <p:nvCxnSpPr>
+            <p:cNvPr id="17" name="Straight Arrow Connector 16">
+              <a:extLst>
+                <a:ext uri="{FF2B5EF4-FFF2-40B4-BE49-F238E27FC236}">
+                  <a16:creationId xmlns:a16="http://schemas.microsoft.com/office/drawing/2014/main" id="{DB07EDE0-DB17-AF40-A8E0-96DB592E6A41}"/>
+                </a:ext>
+              </a:extLst>
+            </p:cNvPr>
+            <p:cNvCxnSpPr/>
+            <p:nvPr/>
+          </p:nvCxnSpPr>
+          <p:spPr>
+            <a:xfrm>
+              <a:off x="3197420" y="1891723"/>
+              <a:ext cx="787307" cy="0"/>
+            </a:xfrm>
+            <a:prstGeom prst="straightConnector1">
+              <a:avLst/>
+            </a:prstGeom>
+            <a:ln>
+              <a:tailEnd type="triangle"/>
+            </a:ln>
+          </p:spPr>
+          <p:style>
+            <a:lnRef idx="1">
+              <a:schemeClr val="dk1"/>
+            </a:lnRef>
+            <a:fillRef idx="0">
+              <a:schemeClr val="dk1"/>
+            </a:fillRef>
+            <a:effectRef idx="0">
+              <a:schemeClr val="dk1"/>
+            </a:effectRef>
+            <a:fontRef idx="minor">
+              <a:schemeClr val="tx1"/>
+            </a:fontRef>
+          </p:style>
+        </p:cxnSp>
+        <p:cxnSp>
+          <p:nvCxnSpPr>
+            <p:cNvPr id="18" name="Straight Arrow Connector 17">
+              <a:extLst>
+                <a:ext uri="{FF2B5EF4-FFF2-40B4-BE49-F238E27FC236}">
+                  <a16:creationId xmlns:a16="http://schemas.microsoft.com/office/drawing/2014/main" id="{29B8F793-CF2C-7F49-9D23-AA1B275B2334}"/>
+                </a:ext>
+              </a:extLst>
+            </p:cNvPr>
+            <p:cNvCxnSpPr/>
+            <p:nvPr/>
+          </p:nvCxnSpPr>
+          <p:spPr>
+            <a:xfrm>
+              <a:off x="4629980" y="1891723"/>
+              <a:ext cx="787307" cy="0"/>
+            </a:xfrm>
+            <a:prstGeom prst="straightConnector1">
+              <a:avLst/>
+            </a:prstGeom>
+            <a:ln>
+              <a:tailEnd type="triangle"/>
+            </a:ln>
+          </p:spPr>
+          <p:style>
+            <a:lnRef idx="1">
+              <a:schemeClr val="dk1"/>
+            </a:lnRef>
+            <a:fillRef idx="0">
+              <a:schemeClr val="dk1"/>
+            </a:fillRef>
+            <a:effectRef idx="0">
+              <a:schemeClr val="dk1"/>
+            </a:effectRef>
+            <a:fontRef idx="minor">
+              <a:schemeClr val="tx1"/>
+            </a:fontRef>
+          </p:style>
+        </p:cxnSp>
+        <p:cxnSp>
+          <p:nvCxnSpPr>
+            <p:cNvPr id="19" name="Straight Arrow Connector 18">
+              <a:extLst>
+                <a:ext uri="{FF2B5EF4-FFF2-40B4-BE49-F238E27FC236}">
+                  <a16:creationId xmlns:a16="http://schemas.microsoft.com/office/drawing/2014/main" id="{90B6C1CE-E7C3-4D4F-91C9-176D89A3242C}"/>
+                </a:ext>
+              </a:extLst>
+            </p:cNvPr>
+            <p:cNvCxnSpPr/>
+            <p:nvPr/>
+          </p:nvCxnSpPr>
+          <p:spPr>
+            <a:xfrm>
+              <a:off x="6062534" y="1891723"/>
+              <a:ext cx="787307" cy="0"/>
+            </a:xfrm>
+            <a:prstGeom prst="straightConnector1">
+              <a:avLst/>
+            </a:prstGeom>
+            <a:ln>
+              <a:tailEnd type="triangle"/>
+            </a:ln>
+          </p:spPr>
+          <p:style>
+            <a:lnRef idx="1">
+              <a:schemeClr val="dk1"/>
+            </a:lnRef>
+            <a:fillRef idx="0">
+              <a:schemeClr val="dk1"/>
+            </a:fillRef>
+            <a:effectRef idx="0">
+              <a:schemeClr val="dk1"/>
+            </a:effectRef>
+            <a:fontRef idx="minor">
+              <a:schemeClr val="tx1"/>
+            </a:fontRef>
+          </p:style>
+        </p:cxnSp>
+        <p:cxnSp>
+          <p:nvCxnSpPr>
+            <p:cNvPr id="20" name="Straight Arrow Connector 19">
+              <a:extLst>
+                <a:ext uri="{FF2B5EF4-FFF2-40B4-BE49-F238E27FC236}">
+                  <a16:creationId xmlns:a16="http://schemas.microsoft.com/office/drawing/2014/main" id="{33E3422A-EDC1-0547-9457-554B21A031CB}"/>
+                </a:ext>
+              </a:extLst>
+            </p:cNvPr>
+            <p:cNvCxnSpPr/>
+            <p:nvPr/>
+          </p:nvCxnSpPr>
+          <p:spPr>
+            <a:xfrm>
+              <a:off x="7495090" y="1891723"/>
+              <a:ext cx="787307" cy="0"/>
+            </a:xfrm>
+            <a:prstGeom prst="straightConnector1">
+              <a:avLst/>
+            </a:prstGeom>
+            <a:ln>
+              <a:tailEnd type="triangle"/>
+            </a:ln>
+          </p:spPr>
+          <p:style>
+            <a:lnRef idx="1">
+              <a:schemeClr val="dk1"/>
+            </a:lnRef>
+            <a:fillRef idx="0">
+              <a:schemeClr val="dk1"/>
+            </a:fillRef>
+            <a:effectRef idx="0">
+              <a:schemeClr val="dk1"/>
+            </a:effectRef>
+            <a:fontRef idx="minor">
+              <a:schemeClr val="tx1"/>
+            </a:fontRef>
+          </p:style>
+        </p:cxnSp>
+        <p:cxnSp>
+          <p:nvCxnSpPr>
+            <p:cNvPr id="21" name="Straight Arrow Connector 20">
+              <a:extLst>
+                <a:ext uri="{FF2B5EF4-FFF2-40B4-BE49-F238E27FC236}">
+                  <a16:creationId xmlns:a16="http://schemas.microsoft.com/office/drawing/2014/main" id="{DA7550C3-98D0-374F-BA6F-B3A3B3FBF285}"/>
+                </a:ext>
+              </a:extLst>
+            </p:cNvPr>
+            <p:cNvCxnSpPr>
+              <a:cxnSpLocks/>
+              <a:stCxn id="6" idx="4"/>
+              <a:endCxn id="7" idx="0"/>
+            </p:cNvCxnSpPr>
+            <p:nvPr/>
+          </p:nvCxnSpPr>
+          <p:spPr>
+            <a:xfrm flipH="1">
+              <a:off x="4307355" y="2214349"/>
+              <a:ext cx="1" cy="695868"/>
+            </a:xfrm>
+            <a:prstGeom prst="straightConnector1">
+              <a:avLst/>
+            </a:prstGeom>
+            <a:ln>
+              <a:tailEnd type="triangle"/>
+            </a:ln>
+          </p:spPr>
+          <p:style>
+            <a:lnRef idx="1">
+              <a:schemeClr val="dk1"/>
+            </a:lnRef>
+            <a:fillRef idx="0">
+              <a:schemeClr val="dk1"/>
+            </a:fillRef>
+            <a:effectRef idx="0">
+              <a:schemeClr val="dk1"/>
+            </a:effectRef>
+            <a:fontRef idx="minor">
+              <a:schemeClr val="tx1"/>
+            </a:fontRef>
+          </p:style>
+        </p:cxnSp>
+        <p:cxnSp>
+          <p:nvCxnSpPr>
+            <p:cNvPr id="22" name="Straight Arrow Connector 21">
+              <a:extLst>
+                <a:ext uri="{FF2B5EF4-FFF2-40B4-BE49-F238E27FC236}">
+                  <a16:creationId xmlns:a16="http://schemas.microsoft.com/office/drawing/2014/main" id="{095CF7E1-9A95-AD4B-AB50-E23716D44350}"/>
+                </a:ext>
+              </a:extLst>
+            </p:cNvPr>
+            <p:cNvCxnSpPr>
+              <a:cxnSpLocks/>
+              <a:endCxn id="8" idx="0"/>
+            </p:cNvCxnSpPr>
+            <p:nvPr/>
+          </p:nvCxnSpPr>
+          <p:spPr>
+            <a:xfrm>
+              <a:off x="4307351" y="3555469"/>
+              <a:ext cx="3" cy="695868"/>
+            </a:xfrm>
+            <a:prstGeom prst="straightConnector1">
+              <a:avLst/>
+            </a:prstGeom>
+            <a:ln>
+              <a:tailEnd type="triangle"/>
+            </a:ln>
+          </p:spPr>
+          <p:style>
+            <a:lnRef idx="1">
+              <a:schemeClr val="dk1"/>
+            </a:lnRef>
+            <a:fillRef idx="0">
+              <a:schemeClr val="dk1"/>
+            </a:fillRef>
+            <a:effectRef idx="0">
+              <a:schemeClr val="dk1"/>
+            </a:effectRef>
+            <a:fontRef idx="minor">
+              <a:schemeClr val="tx1"/>
+            </a:fontRef>
+          </p:style>
+        </p:cxnSp>
+        <p:cxnSp>
+          <p:nvCxnSpPr>
+            <p:cNvPr id="23" name="Straight Arrow Connector 22">
+              <a:extLst>
+                <a:ext uri="{FF2B5EF4-FFF2-40B4-BE49-F238E27FC236}">
+                  <a16:creationId xmlns:a16="http://schemas.microsoft.com/office/drawing/2014/main" id="{3D105553-F354-3E4D-9EFB-1D88E221578E}"/>
+                </a:ext>
+              </a:extLst>
+            </p:cNvPr>
+            <p:cNvCxnSpPr/>
+            <p:nvPr/>
+          </p:nvCxnSpPr>
+          <p:spPr>
+            <a:xfrm>
+              <a:off x="4629980" y="3232843"/>
+              <a:ext cx="787307" cy="0"/>
+            </a:xfrm>
+            <a:prstGeom prst="straightConnector1">
+              <a:avLst/>
+            </a:prstGeom>
+            <a:ln>
+              <a:tailEnd type="triangle"/>
+            </a:ln>
+          </p:spPr>
+          <p:style>
+            <a:lnRef idx="1">
+              <a:schemeClr val="dk1"/>
+            </a:lnRef>
+            <a:fillRef idx="0">
+              <a:schemeClr val="dk1"/>
+            </a:fillRef>
+            <a:effectRef idx="0">
+              <a:schemeClr val="dk1"/>
+            </a:effectRef>
+            <a:fontRef idx="minor">
+              <a:schemeClr val="tx1"/>
+            </a:fontRef>
+          </p:style>
+        </p:cxnSp>
+        <p:cxnSp>
+          <p:nvCxnSpPr>
+            <p:cNvPr id="24" name="Straight Arrow Connector 23">
+              <a:extLst>
+                <a:ext uri="{FF2B5EF4-FFF2-40B4-BE49-F238E27FC236}">
+                  <a16:creationId xmlns:a16="http://schemas.microsoft.com/office/drawing/2014/main" id="{DE533968-F621-7744-8044-6786BF98FF29}"/>
+                </a:ext>
+              </a:extLst>
+            </p:cNvPr>
+            <p:cNvCxnSpPr/>
+            <p:nvPr/>
+          </p:nvCxnSpPr>
+          <p:spPr>
+            <a:xfrm>
+              <a:off x="6062534" y="3232843"/>
+              <a:ext cx="787307" cy="0"/>
+            </a:xfrm>
+            <a:prstGeom prst="straightConnector1">
+              <a:avLst/>
+            </a:prstGeom>
+            <a:ln>
+              <a:tailEnd type="triangle"/>
+            </a:ln>
+          </p:spPr>
+          <p:style>
+            <a:lnRef idx="1">
+              <a:schemeClr val="dk1"/>
+            </a:lnRef>
+            <a:fillRef idx="0">
+              <a:schemeClr val="dk1"/>
+            </a:fillRef>
+            <a:effectRef idx="0">
+              <a:schemeClr val="dk1"/>
+            </a:effectRef>
+            <a:fontRef idx="minor">
+              <a:schemeClr val="tx1"/>
+            </a:fontRef>
+          </p:style>
+        </p:cxnSp>
+        <p:cxnSp>
+          <p:nvCxnSpPr>
+            <p:cNvPr id="25" name="Straight Arrow Connector 24">
+              <a:extLst>
+                <a:ext uri="{FF2B5EF4-FFF2-40B4-BE49-F238E27FC236}">
+                  <a16:creationId xmlns:a16="http://schemas.microsoft.com/office/drawing/2014/main" id="{023DF502-3665-0747-B55E-A9762439B3E6}"/>
+                </a:ext>
+              </a:extLst>
+            </p:cNvPr>
+            <p:cNvCxnSpPr/>
+            <p:nvPr/>
+          </p:nvCxnSpPr>
+          <p:spPr>
+            <a:xfrm>
+              <a:off x="7495090" y="3232843"/>
+              <a:ext cx="787307" cy="0"/>
+            </a:xfrm>
+            <a:prstGeom prst="straightConnector1">
+              <a:avLst/>
+            </a:prstGeom>
+            <a:ln>
+              <a:tailEnd type="triangle"/>
+            </a:ln>
+          </p:spPr>
+          <p:style>
+            <a:lnRef idx="1">
+              <a:schemeClr val="dk1"/>
+            </a:lnRef>
+            <a:fillRef idx="0">
+              <a:schemeClr val="dk1"/>
+            </a:fillRef>
+            <a:effectRef idx="0">
+              <a:schemeClr val="dk1"/>
+            </a:effectRef>
+            <a:fontRef idx="minor">
+              <a:schemeClr val="tx1"/>
+            </a:fontRef>
+          </p:style>
+        </p:cxnSp>
+        <p:cxnSp>
+          <p:nvCxnSpPr>
+            <p:cNvPr id="26" name="Straight Arrow Connector 25">
+              <a:extLst>
+                <a:ext uri="{FF2B5EF4-FFF2-40B4-BE49-F238E27FC236}">
+                  <a16:creationId xmlns:a16="http://schemas.microsoft.com/office/drawing/2014/main" id="{258A029A-09FE-B847-B745-D210D74CC067}"/>
+                </a:ext>
+              </a:extLst>
+            </p:cNvPr>
+            <p:cNvCxnSpPr/>
+            <p:nvPr/>
+          </p:nvCxnSpPr>
+          <p:spPr>
+            <a:xfrm>
+              <a:off x="4629980" y="4596823"/>
+              <a:ext cx="787307" cy="0"/>
+            </a:xfrm>
+            <a:prstGeom prst="straightConnector1">
+              <a:avLst/>
+            </a:prstGeom>
+            <a:ln w="38100">
+              <a:solidFill>
+                <a:schemeClr val="tx1">
+                  <a:lumMod val="95000"/>
+                  <a:lumOff val="5000"/>
+                </a:schemeClr>
+              </a:solidFill>
+              <a:tailEnd type="stealth" w="lg" len="lg"/>
+            </a:ln>
+          </p:spPr>
+          <p:style>
+            <a:lnRef idx="1">
+              <a:schemeClr val="dk1"/>
+            </a:lnRef>
+            <a:fillRef idx="0">
+              <a:schemeClr val="dk1"/>
+            </a:fillRef>
+            <a:effectRef idx="0">
+              <a:schemeClr val="dk1"/>
+            </a:effectRef>
+            <a:fontRef idx="minor">
+              <a:schemeClr val="tx1"/>
+            </a:fontRef>
+          </p:style>
+        </p:cxnSp>
+        <p:cxnSp>
+          <p:nvCxnSpPr>
+            <p:cNvPr id="27" name="Straight Arrow Connector 26">
+              <a:extLst>
+                <a:ext uri="{FF2B5EF4-FFF2-40B4-BE49-F238E27FC236}">
+                  <a16:creationId xmlns:a16="http://schemas.microsoft.com/office/drawing/2014/main" id="{71F2EB6B-138D-FB44-94D5-E2AA77126F48}"/>
+                </a:ext>
+              </a:extLst>
+            </p:cNvPr>
+            <p:cNvCxnSpPr/>
+            <p:nvPr/>
+          </p:nvCxnSpPr>
+          <p:spPr>
+            <a:xfrm>
+              <a:off x="6062534" y="4596823"/>
+              <a:ext cx="787307" cy="0"/>
+            </a:xfrm>
+            <a:prstGeom prst="straightConnector1">
+              <a:avLst/>
+            </a:prstGeom>
+            <a:ln>
+              <a:tailEnd type="triangle"/>
+            </a:ln>
+          </p:spPr>
+          <p:style>
+            <a:lnRef idx="1">
+              <a:schemeClr val="dk1"/>
+            </a:lnRef>
+            <a:fillRef idx="0">
+              <a:schemeClr val="dk1"/>
+            </a:fillRef>
+            <a:effectRef idx="0">
+              <a:schemeClr val="dk1"/>
+            </a:effectRef>
+            <a:fontRef idx="minor">
+              <a:schemeClr val="tx1"/>
+            </a:fontRef>
+          </p:style>
+        </p:cxnSp>
+        <p:cxnSp>
+          <p:nvCxnSpPr>
+            <p:cNvPr id="28" name="Straight Arrow Connector 27">
+              <a:extLst>
+                <a:ext uri="{FF2B5EF4-FFF2-40B4-BE49-F238E27FC236}">
+                  <a16:creationId xmlns:a16="http://schemas.microsoft.com/office/drawing/2014/main" id="{B7C5E823-DA8D-5D44-B19D-6DE4D38A240F}"/>
+                </a:ext>
+              </a:extLst>
+            </p:cNvPr>
+            <p:cNvCxnSpPr/>
+            <p:nvPr/>
+          </p:nvCxnSpPr>
+          <p:spPr>
+            <a:xfrm>
+              <a:off x="7495090" y="4596823"/>
+              <a:ext cx="787307" cy="0"/>
+            </a:xfrm>
+            <a:prstGeom prst="straightConnector1">
+              <a:avLst/>
+            </a:prstGeom>
+            <a:ln>
+              <a:tailEnd type="triangle"/>
+            </a:ln>
+          </p:spPr>
+          <p:style>
+            <a:lnRef idx="1">
+              <a:schemeClr val="dk1"/>
+            </a:lnRef>
+            <a:fillRef idx="0">
+              <a:schemeClr val="dk1"/>
+            </a:fillRef>
+            <a:effectRef idx="0">
+              <a:schemeClr val="dk1"/>
+            </a:effectRef>
+            <a:fontRef idx="minor">
+              <a:schemeClr val="tx1"/>
+            </a:fontRef>
+          </p:style>
+        </p:cxnSp>
+        <p:sp>
+          <p:nvSpPr>
+            <p:cNvPr id="30" name="Rounded Rectangle 29">
+              <a:extLst>
+                <a:ext uri="{FF2B5EF4-FFF2-40B4-BE49-F238E27FC236}">
+                  <a16:creationId xmlns:a16="http://schemas.microsoft.com/office/drawing/2014/main" id="{07BDEE80-C027-7F46-9069-34C166B51671}"/>
+                </a:ext>
+              </a:extLst>
+            </p:cNvPr>
+            <p:cNvSpPr/>
+            <p:nvPr/>
+          </p:nvSpPr>
+          <p:spPr>
+            <a:xfrm>
+              <a:off x="5210631" y="1204018"/>
+              <a:ext cx="993954" cy="4057648"/>
+            </a:xfrm>
+            <a:prstGeom prst="roundRect">
+              <a:avLst/>
+            </a:prstGeom>
+            <a:solidFill>
+              <a:schemeClr val="accent1">
+                <a:alpha val="29000"/>
+              </a:schemeClr>
+            </a:solidFill>
+            <a:ln>
+              <a:noFill/>
+            </a:ln>
+          </p:spPr>
+          <p:style>
+            <a:lnRef idx="2">
+              <a:schemeClr val="accent1">
+                <a:shade val="50000"/>
+              </a:schemeClr>
+            </a:lnRef>
+            <a:fillRef idx="1">
+              <a:schemeClr val="accent1"/>
+            </a:fillRef>
+            <a:effectRef idx="0">
+              <a:schemeClr val="accent1"/>
+            </a:effectRef>
+            <a:fontRef idx="minor">
+              <a:schemeClr val="lt1"/>
+            </a:fontRef>
+          </p:style>
+          <p:txBody>
+            <a:bodyPr rtlCol="0" anchor="ctr"/>
+            <a:lstStyle/>
+            <a:p>
+              <a:pPr algn="ctr"/>
+              <a:endParaRPr lang="en-US"/>
+            </a:p>
+          </p:txBody>
+        </p:sp>
+        <p:grpSp>
+          <p:nvGrpSpPr>
+            <p:cNvPr id="51" name="Group 50">
+              <a:extLst>
+                <a:ext uri="{FF2B5EF4-FFF2-40B4-BE49-F238E27FC236}">
+                  <a16:creationId xmlns:a16="http://schemas.microsoft.com/office/drawing/2014/main" id="{4AF37C9D-9899-6A46-BA4C-91E0016BFFEB}"/>
+                </a:ext>
+              </a:extLst>
+            </p:cNvPr>
+            <p:cNvGrpSpPr/>
+            <p:nvPr/>
+          </p:nvGrpSpPr>
+          <p:grpSpPr>
+            <a:xfrm>
+              <a:off x="2865077" y="275771"/>
+              <a:ext cx="2882580" cy="1293326"/>
+              <a:chOff x="3585029" y="275771"/>
+              <a:chExt cx="2162628" cy="1293326"/>
+            </a:xfrm>
+          </p:grpSpPr>
+          <p:cxnSp>
+            <p:nvCxnSpPr>
+              <p:cNvPr id="40" name="Straight Arrow Connector 39">
+                <a:extLst>
+                  <a:ext uri="{FF2B5EF4-FFF2-40B4-BE49-F238E27FC236}">
+                    <a16:creationId xmlns:a16="http://schemas.microsoft.com/office/drawing/2014/main" id="{BCB25BC4-2CC9-4642-8A92-42B94FA25F72}"/>
+                  </a:ext>
+                </a:extLst>
+              </p:cNvPr>
+              <p:cNvCxnSpPr>
+                <a:cxnSpLocks/>
+              </p:cNvCxnSpPr>
+              <p:nvPr/>
+            </p:nvCxnSpPr>
+            <p:spPr>
+              <a:xfrm flipV="1">
+                <a:off x="3585029" y="275772"/>
+                <a:ext cx="1" cy="1293325"/>
+              </a:xfrm>
+              <a:prstGeom prst="straightConnector1">
+                <a:avLst/>
+              </a:prstGeom>
+              <a:ln w="31750">
+                <a:tailEnd type="none"/>
+              </a:ln>
+            </p:spPr>
+            <p:style>
+              <a:lnRef idx="1">
+                <a:schemeClr val="accent1"/>
+              </a:lnRef>
+              <a:fillRef idx="0">
+                <a:schemeClr val="accent1"/>
+              </a:fillRef>
+              <a:effectRef idx="0">
+                <a:schemeClr val="accent1"/>
+              </a:effectRef>
+              <a:fontRef idx="minor">
+                <a:schemeClr val="tx1"/>
+              </a:fontRef>
+            </p:style>
+          </p:cxnSp>
+          <p:cxnSp>
+            <p:nvCxnSpPr>
+              <p:cNvPr id="41" name="Straight Arrow Connector 40">
+                <a:extLst>
+                  <a:ext uri="{FF2B5EF4-FFF2-40B4-BE49-F238E27FC236}">
+                    <a16:creationId xmlns:a16="http://schemas.microsoft.com/office/drawing/2014/main" id="{65ED21AD-A008-8E47-A427-B9E8CEC2CBEE}"/>
+                  </a:ext>
+                </a:extLst>
+              </p:cNvPr>
+              <p:cNvCxnSpPr>
+                <a:cxnSpLocks/>
+                <a:endCxn id="9" idx="0"/>
+              </p:cNvCxnSpPr>
+              <p:nvPr/>
+            </p:nvCxnSpPr>
+            <p:spPr>
+              <a:xfrm>
+                <a:off x="5739911" y="275771"/>
+                <a:ext cx="3" cy="1293326"/>
+              </a:xfrm>
+              <a:prstGeom prst="straightConnector1">
+                <a:avLst/>
+              </a:prstGeom>
+              <a:ln w="31750">
+                <a:tailEnd type="stealth" w="lg" len="lg"/>
+              </a:ln>
+            </p:spPr>
+            <p:style>
+              <a:lnRef idx="1">
+                <a:schemeClr val="accent1"/>
+              </a:lnRef>
+              <a:fillRef idx="0">
+                <a:schemeClr val="accent1"/>
+              </a:fillRef>
+              <a:effectRef idx="0">
+                <a:schemeClr val="accent1"/>
+              </a:effectRef>
+              <a:fontRef idx="minor">
+                <a:schemeClr val="tx1"/>
+              </a:fontRef>
+            </p:style>
+          </p:cxnSp>
+          <p:cxnSp>
+            <p:nvCxnSpPr>
+              <p:cNvPr id="44" name="Straight Connector 43">
+                <a:extLst>
+                  <a:ext uri="{FF2B5EF4-FFF2-40B4-BE49-F238E27FC236}">
+                    <a16:creationId xmlns:a16="http://schemas.microsoft.com/office/drawing/2014/main" id="{E5AE1956-F48B-F64C-86B5-9A08888BE418}"/>
+                  </a:ext>
+                </a:extLst>
+              </p:cNvPr>
+              <p:cNvCxnSpPr>
+                <a:cxnSpLocks/>
+              </p:cNvCxnSpPr>
+              <p:nvPr/>
+            </p:nvCxnSpPr>
+            <p:spPr>
+              <a:xfrm>
+                <a:off x="3585029" y="275771"/>
+                <a:ext cx="2162628" cy="0"/>
+              </a:xfrm>
+              <a:prstGeom prst="line">
+                <a:avLst/>
+              </a:prstGeom>
+              <a:ln w="31750"/>
+            </p:spPr>
+            <p:style>
+              <a:lnRef idx="1">
+                <a:schemeClr val="accent1"/>
+              </a:lnRef>
+              <a:fillRef idx="0">
+                <a:schemeClr val="accent1"/>
+              </a:fillRef>
+              <a:effectRef idx="0">
+                <a:schemeClr val="accent1"/>
+              </a:effectRef>
+              <a:fontRef idx="minor">
+                <a:schemeClr val="tx1"/>
+              </a:fontRef>
+            </p:style>
+          </p:cxnSp>
+        </p:grpSp>
+        <p:grpSp>
+          <p:nvGrpSpPr>
+            <p:cNvPr id="52" name="Group 51">
+              <a:extLst>
+                <a:ext uri="{FF2B5EF4-FFF2-40B4-BE49-F238E27FC236}">
+                  <a16:creationId xmlns:a16="http://schemas.microsoft.com/office/drawing/2014/main" id="{2B43565A-0E9A-DC4F-87A0-E01385824D77}"/>
+                </a:ext>
+              </a:extLst>
+            </p:cNvPr>
+            <p:cNvGrpSpPr/>
+            <p:nvPr/>
+          </p:nvGrpSpPr>
+          <p:grpSpPr>
+            <a:xfrm rot="10800000">
+              <a:off x="1442236" y="2214349"/>
+              <a:ext cx="849241" cy="1529220"/>
+              <a:chOff x="3585027" y="275771"/>
+              <a:chExt cx="1400477" cy="1529220"/>
+            </a:xfrm>
+          </p:grpSpPr>
+          <p:cxnSp>
+            <p:nvCxnSpPr>
+              <p:cNvPr id="54" name="Straight Arrow Connector 53">
+                <a:extLst>
+                  <a:ext uri="{FF2B5EF4-FFF2-40B4-BE49-F238E27FC236}">
+                    <a16:creationId xmlns:a16="http://schemas.microsoft.com/office/drawing/2014/main" id="{31153D08-0A53-BB42-8B94-6F82CE43AE5C}"/>
+                  </a:ext>
+                </a:extLst>
+              </p:cNvPr>
+              <p:cNvCxnSpPr>
+                <a:cxnSpLocks/>
+                <a:endCxn id="4" idx="4"/>
+              </p:cNvCxnSpPr>
+              <p:nvPr/>
+            </p:nvCxnSpPr>
+            <p:spPr>
+              <a:xfrm rot="10800000" flipV="1">
+                <a:off x="4985504" y="275772"/>
+                <a:ext cx="0" cy="1529219"/>
+              </a:xfrm>
+              <a:prstGeom prst="straightConnector1">
+                <a:avLst/>
+              </a:prstGeom>
+              <a:ln w="31750">
+                <a:solidFill>
+                  <a:srgbClr val="C00000"/>
+                </a:solidFill>
+                <a:tailEnd type="stealth" w="lg" len="lg"/>
+              </a:ln>
+            </p:spPr>
+            <p:style>
+              <a:lnRef idx="1">
+                <a:schemeClr val="accent1"/>
+              </a:lnRef>
+              <a:fillRef idx="0">
+                <a:schemeClr val="accent1"/>
+              </a:fillRef>
+              <a:effectRef idx="0">
+                <a:schemeClr val="accent1"/>
+              </a:effectRef>
+              <a:fontRef idx="minor">
+                <a:schemeClr val="tx1"/>
+              </a:fontRef>
+            </p:style>
+          </p:cxnSp>
+          <p:cxnSp>
+            <p:nvCxnSpPr>
+              <p:cNvPr id="55" name="Straight Connector 54">
+                <a:extLst>
+                  <a:ext uri="{FF2B5EF4-FFF2-40B4-BE49-F238E27FC236}">
+                    <a16:creationId xmlns:a16="http://schemas.microsoft.com/office/drawing/2014/main" id="{DBC27106-823A-3A43-A9AB-D442DBAD9DE6}"/>
+                  </a:ext>
+                </a:extLst>
+              </p:cNvPr>
+              <p:cNvCxnSpPr>
+                <a:cxnSpLocks/>
+              </p:cNvCxnSpPr>
+              <p:nvPr/>
+            </p:nvCxnSpPr>
+            <p:spPr>
+              <a:xfrm rot="10800000" flipH="1" flipV="1">
+                <a:off x="3585027" y="275771"/>
+                <a:ext cx="1400477" cy="1"/>
+              </a:xfrm>
+              <a:prstGeom prst="line">
+                <a:avLst/>
+              </a:prstGeom>
+              <a:ln w="31750">
+                <a:solidFill>
+                  <a:srgbClr val="C00000"/>
+                </a:solidFill>
+              </a:ln>
+            </p:spPr>
+            <p:style>
+              <a:lnRef idx="1">
+                <a:schemeClr val="accent1"/>
+              </a:lnRef>
+              <a:fillRef idx="0">
+                <a:schemeClr val="accent1"/>
+              </a:fillRef>
+              <a:effectRef idx="0">
+                <a:schemeClr val="accent1"/>
+              </a:effectRef>
+              <a:fontRef idx="minor">
+                <a:schemeClr val="tx1"/>
+              </a:fontRef>
+            </p:style>
+          </p:cxnSp>
+        </p:grpSp>
+        <mc:AlternateContent xmlns:mc="http://schemas.openxmlformats.org/markup-compatibility/2006">
+          <mc:Choice xmlns:a14="http://schemas.microsoft.com/office/drawing/2010/main" Requires="a14">
+            <p:sp>
+              <p:nvSpPr>
+                <p:cNvPr id="59" name="Rectangle 58">
+                  <a:extLst>
+                    <a:ext uri="{FF2B5EF4-FFF2-40B4-BE49-F238E27FC236}">
+                      <a16:creationId xmlns:a16="http://schemas.microsoft.com/office/drawing/2014/main" id="{C52EDBB2-77E6-0342-955C-DDC038AF6C4C}"/>
+                    </a:ext>
+                  </a:extLst>
+                </p:cNvPr>
+                <p:cNvSpPr/>
+                <p:nvPr/>
+              </p:nvSpPr>
+              <p:spPr>
+                <a:xfrm>
+                  <a:off x="1701129" y="3365705"/>
+                  <a:ext cx="374140" cy="369332"/>
+                </a:xfrm>
+                <a:prstGeom prst="rect">
+                  <a:avLst/>
+                </a:prstGeom>
+              </p:spPr>
+              <p:txBody>
+                <a:bodyPr wrap="none">
+                  <a:spAutoFit/>
+                </a:bodyPr>
+                <a:lstStyle/>
+                <a:p>
+                  <a14:m>
+                    <m:oMathPara xmlns:m="http://schemas.openxmlformats.org/officeDocument/2006/math">
+                      <m:oMathParaPr>
+                        <m:jc m:val="centerGroup"/>
+                      </m:oMathParaPr>
+                      <m:oMath xmlns:m="http://schemas.openxmlformats.org/officeDocument/2006/math">
+                        <m:r>
+                          <a:rPr lang="en-US" b="0" i="1" smtClean="0">
+                            <a:latin typeface="Cambria Math" panose="02040503050406030204" pitchFamily="18" charset="0"/>
+                          </a:rPr>
+                          <m:t>𝜃</m:t>
+                        </m:r>
+                      </m:oMath>
+                    </m:oMathPara>
+                  </a14:m>
+                  <a:endParaRPr lang="en-US" dirty="0"/>
+                </a:p>
+              </p:txBody>
+            </p:sp>
+          </mc:Choice>
+          <mc:Fallback>
+            <p:sp>
+              <p:nvSpPr>
+                <p:cNvPr id="59" name="Rectangle 58">
+                  <a:extLst>
+                    <a:ext uri="{FF2B5EF4-FFF2-40B4-BE49-F238E27FC236}">
+                      <a16:creationId xmlns:a16="http://schemas.microsoft.com/office/drawing/2014/main" id="{C52EDBB2-77E6-0342-955C-DDC038AF6C4C}"/>
+                    </a:ext>
+                  </a:extLst>
+                </p:cNvPr>
+                <p:cNvSpPr>
+                  <a:spLocks noRot="1" noChangeAspect="1" noMove="1" noResize="1" noEditPoints="1" noAdjustHandles="1" noChangeArrowheads="1" noChangeShapeType="1" noTextEdit="1"/>
+                </p:cNvSpPr>
+                <p:nvPr/>
+              </p:nvSpPr>
+              <p:spPr>
+                <a:xfrm>
+                  <a:off x="1701129" y="3365705"/>
+                  <a:ext cx="374140" cy="369332"/>
+                </a:xfrm>
+                <a:prstGeom prst="rect">
+                  <a:avLst/>
+                </a:prstGeom>
+                <a:blipFill>
+                  <a:blip r:embed="rId14"/>
+                  <a:stretch>
+                    <a:fillRect/>
+                  </a:stretch>
+                </a:blipFill>
+              </p:spPr>
+              <p:txBody>
+                <a:bodyPr/>
+                <a:lstStyle/>
+                <a:p>
+                  <a:r>
+                    <a:rPr lang="en-US">
+                      <a:noFill/>
+                    </a:rPr>
+                    <a:t> </a:t>
+                  </a:r>
+                </a:p>
+              </p:txBody>
+            </p:sp>
+          </mc:Fallback>
+        </mc:AlternateContent>
+        <mc:AlternateContent xmlns:mc="http://schemas.openxmlformats.org/markup-compatibility/2006">
+          <mc:Choice xmlns:a14="http://schemas.microsoft.com/office/drawing/2010/main" Requires="a14">
+            <p:sp>
+              <p:nvSpPr>
+                <p:cNvPr id="60" name="Rectangle 59">
+                  <a:extLst>
+                    <a:ext uri="{FF2B5EF4-FFF2-40B4-BE49-F238E27FC236}">
+                      <a16:creationId xmlns:a16="http://schemas.microsoft.com/office/drawing/2014/main" id="{A61BDFFC-3930-0840-87AC-F02FAA7DEDAC}"/>
+                    </a:ext>
+                  </a:extLst>
+                </p:cNvPr>
+                <p:cNvSpPr/>
+                <p:nvPr/>
+              </p:nvSpPr>
+              <p:spPr>
+                <a:xfrm>
+                  <a:off x="1809988" y="1515137"/>
+                  <a:ext cx="793101" cy="369332"/>
+                </a:xfrm>
+                <a:prstGeom prst="rect">
+                  <a:avLst/>
+                </a:prstGeom>
+              </p:spPr>
+              <p:txBody>
+                <a:bodyPr wrap="none">
+                  <a:spAutoFit/>
+                </a:bodyPr>
+                <a:lstStyle/>
+                <a:p>
+                  <a14:m>
+                    <m:oMathPara xmlns:m="http://schemas.openxmlformats.org/officeDocument/2006/math">
+                      <m:oMathParaPr>
+                        <m:jc m:val="centerGroup"/>
+                      </m:oMathParaPr>
+                      <m:oMath xmlns:m="http://schemas.openxmlformats.org/officeDocument/2006/math">
+                        <m:r>
+                          <a:rPr lang="en-US" b="0" i="1" smtClean="0">
+                            <a:latin typeface="Cambria Math" panose="02040503050406030204" pitchFamily="18" charset="0"/>
+                          </a:rPr>
+                          <m:t>𝛽</m:t>
+                        </m:r>
+                        <m:r>
+                          <a:rPr lang="en-US" b="0" i="1" smtClean="0">
+                            <a:latin typeface="Cambria Math" panose="02040503050406030204" pitchFamily="18" charset="0"/>
+                          </a:rPr>
+                          <m:t>−</m:t>
+                        </m:r>
+                        <m:r>
+                          <a:rPr lang="en-US" b="0" i="1" smtClean="0">
+                            <a:latin typeface="Cambria Math" panose="02040503050406030204" pitchFamily="18" charset="0"/>
+                          </a:rPr>
+                          <m:t>𝑘</m:t>
+                        </m:r>
+                      </m:oMath>
+                    </m:oMathPara>
+                  </a14:m>
+                  <a:endParaRPr lang="en-US" dirty="0"/>
+                </a:p>
+              </p:txBody>
+            </p:sp>
+          </mc:Choice>
+          <mc:Fallback>
+            <p:sp>
+              <p:nvSpPr>
+                <p:cNvPr id="60" name="Rectangle 59">
+                  <a:extLst>
+                    <a:ext uri="{FF2B5EF4-FFF2-40B4-BE49-F238E27FC236}">
+                      <a16:creationId xmlns:a16="http://schemas.microsoft.com/office/drawing/2014/main" id="{A61BDFFC-3930-0840-87AC-F02FAA7DEDAC}"/>
+                    </a:ext>
+                  </a:extLst>
+                </p:cNvPr>
+                <p:cNvSpPr>
+                  <a:spLocks noRot="1" noChangeAspect="1" noMove="1" noResize="1" noEditPoints="1" noAdjustHandles="1" noChangeArrowheads="1" noChangeShapeType="1" noTextEdit="1"/>
+                </p:cNvSpPr>
+                <p:nvPr/>
+              </p:nvSpPr>
+              <p:spPr>
+                <a:xfrm>
+                  <a:off x="1809988" y="1515137"/>
+                  <a:ext cx="793101" cy="369332"/>
+                </a:xfrm>
+                <a:prstGeom prst="rect">
+                  <a:avLst/>
+                </a:prstGeom>
+                <a:blipFill>
+                  <a:blip r:embed="rId15"/>
+                  <a:stretch>
+                    <a:fillRect b="-9677"/>
+                  </a:stretch>
+                </a:blipFill>
+              </p:spPr>
+              <p:txBody>
+                <a:bodyPr/>
+                <a:lstStyle/>
+                <a:p>
+                  <a:r>
+                    <a:rPr lang="en-US">
+                      <a:noFill/>
+                    </a:rPr>
+                    <a:t> </a:t>
+                  </a:r>
+                </a:p>
+              </p:txBody>
+            </p:sp>
+          </mc:Fallback>
+        </mc:AlternateContent>
+        <mc:AlternateContent xmlns:mc="http://schemas.openxmlformats.org/markup-compatibility/2006">
+          <mc:Choice xmlns:a14="http://schemas.microsoft.com/office/drawing/2010/main" Requires="a14">
+            <p:sp>
+              <p:nvSpPr>
+                <p:cNvPr id="61" name="Rectangle 60">
+                  <a:extLst>
+                    <a:ext uri="{FF2B5EF4-FFF2-40B4-BE49-F238E27FC236}">
+                      <a16:creationId xmlns:a16="http://schemas.microsoft.com/office/drawing/2014/main" id="{0F21BBBC-A5DD-B24C-881D-44B76110F82B}"/>
+                    </a:ext>
+                  </a:extLst>
+                </p:cNvPr>
+                <p:cNvSpPr/>
+                <p:nvPr/>
+              </p:nvSpPr>
+              <p:spPr>
+                <a:xfrm>
+                  <a:off x="3392284" y="1515137"/>
+                  <a:ext cx="370935" cy="369332"/>
+                </a:xfrm>
+                <a:prstGeom prst="rect">
+                  <a:avLst/>
+                </a:prstGeom>
+              </p:spPr>
+              <p:txBody>
+                <a:bodyPr wrap="none">
+                  <a:spAutoFit/>
+                </a:bodyPr>
+                <a:lstStyle/>
+                <a:p>
+                  <a14:m>
+                    <m:oMathPara xmlns:m="http://schemas.openxmlformats.org/officeDocument/2006/math">
+                      <m:oMathParaPr>
+                        <m:jc m:val="centerGroup"/>
+                      </m:oMathParaPr>
+                      <m:oMath xmlns:m="http://schemas.openxmlformats.org/officeDocument/2006/math">
+                        <m:r>
+                          <a:rPr lang="en-US" b="0" i="1" smtClean="0">
+                            <a:latin typeface="Cambria Math" panose="02040503050406030204" pitchFamily="18" charset="0"/>
+                          </a:rPr>
+                          <m:t>𝑘</m:t>
+                        </m:r>
+                      </m:oMath>
+                    </m:oMathPara>
+                  </a14:m>
+                  <a:endParaRPr lang="en-US" dirty="0"/>
+                </a:p>
+              </p:txBody>
+            </p:sp>
+          </mc:Choice>
+          <mc:Fallback>
+            <p:sp>
+              <p:nvSpPr>
+                <p:cNvPr id="61" name="Rectangle 60">
+                  <a:extLst>
+                    <a:ext uri="{FF2B5EF4-FFF2-40B4-BE49-F238E27FC236}">
+                      <a16:creationId xmlns:a16="http://schemas.microsoft.com/office/drawing/2014/main" id="{0F21BBBC-A5DD-B24C-881D-44B76110F82B}"/>
+                    </a:ext>
+                  </a:extLst>
+                </p:cNvPr>
+                <p:cNvSpPr>
+                  <a:spLocks noRot="1" noChangeAspect="1" noMove="1" noResize="1" noEditPoints="1" noAdjustHandles="1" noChangeArrowheads="1" noChangeShapeType="1" noTextEdit="1"/>
+                </p:cNvSpPr>
+                <p:nvPr/>
+              </p:nvSpPr>
+              <p:spPr>
+                <a:xfrm>
+                  <a:off x="3392284" y="1515137"/>
+                  <a:ext cx="370935" cy="369332"/>
+                </a:xfrm>
+                <a:prstGeom prst="rect">
+                  <a:avLst/>
+                </a:prstGeom>
+                <a:blipFill>
+                  <a:blip r:embed="rId16"/>
+                  <a:stretch>
+                    <a:fillRect/>
+                  </a:stretch>
+                </a:blipFill>
+              </p:spPr>
+              <p:txBody>
+                <a:bodyPr/>
+                <a:lstStyle/>
+                <a:p>
+                  <a:r>
+                    <a:rPr lang="en-US">
+                      <a:noFill/>
+                    </a:rPr>
+                    <a:t> </a:t>
+                  </a:r>
+                </a:p>
+              </p:txBody>
+            </p:sp>
+          </mc:Fallback>
+        </mc:AlternateContent>
+        <mc:AlternateContent xmlns:mc="http://schemas.openxmlformats.org/markup-compatibility/2006">
+          <mc:Choice xmlns:a14="http://schemas.microsoft.com/office/drawing/2010/main" Requires="a14">
+            <p:sp>
+              <p:nvSpPr>
+                <p:cNvPr id="62" name="Rectangle 61">
+                  <a:extLst>
+                    <a:ext uri="{FF2B5EF4-FFF2-40B4-BE49-F238E27FC236}">
+                      <a16:creationId xmlns:a16="http://schemas.microsoft.com/office/drawing/2014/main" id="{F19419A1-882F-6C47-94FC-69B4274459E4}"/>
+                    </a:ext>
+                  </a:extLst>
+                </p:cNvPr>
+                <p:cNvSpPr/>
+                <p:nvPr/>
+              </p:nvSpPr>
+              <p:spPr>
+                <a:xfrm>
+                  <a:off x="4807426" y="1536908"/>
+                  <a:ext cx="477951" cy="369332"/>
+                </a:xfrm>
+                <a:prstGeom prst="rect">
+                  <a:avLst/>
+                </a:prstGeom>
+              </p:spPr>
+              <p:txBody>
+                <a:bodyPr wrap="none">
+                  <a:spAutoFit/>
+                </a:bodyPr>
+                <a:lstStyle/>
+                <a:p>
+                  <a14:m>
+                    <m:oMathPara xmlns:m="http://schemas.openxmlformats.org/officeDocument/2006/math">
+                      <m:oMathParaPr>
+                        <m:jc m:val="centerGroup"/>
+                      </m:oMathParaPr>
+                      <m:oMath xmlns:m="http://schemas.openxmlformats.org/officeDocument/2006/math">
+                        <m:sSub>
+                          <m:sSubPr>
+                            <m:ctrlPr>
+                              <a:rPr lang="en-US" b="0" i="1" smtClean="0">
+                                <a:latin typeface="Cambria Math" panose="02040503050406030204" pitchFamily="18" charset="0"/>
+                              </a:rPr>
+                            </m:ctrlPr>
+                          </m:sSubPr>
+                          <m:e>
+                            <m:r>
+                              <a:rPr lang="en-US" b="0" i="1" smtClean="0">
+                                <a:latin typeface="Cambria Math" panose="02040503050406030204" pitchFamily="18" charset="0"/>
+                              </a:rPr>
+                              <m:t>𝑑</m:t>
+                            </m:r>
+                          </m:e>
+                          <m:sub>
+                            <m:r>
+                              <a:rPr lang="en-US" b="0" i="1" smtClean="0">
+                                <a:latin typeface="Cambria Math" panose="02040503050406030204" pitchFamily="18" charset="0"/>
+                              </a:rPr>
+                              <m:t>0</m:t>
+                            </m:r>
+                          </m:sub>
+                        </m:sSub>
+                      </m:oMath>
+                    </m:oMathPara>
+                  </a14:m>
+                  <a:endParaRPr lang="en-US" dirty="0"/>
+                </a:p>
+              </p:txBody>
+            </p:sp>
+          </mc:Choice>
+          <mc:Fallback>
+            <p:sp>
+              <p:nvSpPr>
+                <p:cNvPr id="62" name="Rectangle 61">
+                  <a:extLst>
+                    <a:ext uri="{FF2B5EF4-FFF2-40B4-BE49-F238E27FC236}">
+                      <a16:creationId xmlns:a16="http://schemas.microsoft.com/office/drawing/2014/main" id="{F19419A1-882F-6C47-94FC-69B4274459E4}"/>
+                    </a:ext>
+                  </a:extLst>
+                </p:cNvPr>
+                <p:cNvSpPr>
+                  <a:spLocks noRot="1" noChangeAspect="1" noMove="1" noResize="1" noEditPoints="1" noAdjustHandles="1" noChangeArrowheads="1" noChangeShapeType="1" noTextEdit="1"/>
+                </p:cNvSpPr>
+                <p:nvPr/>
+              </p:nvSpPr>
+              <p:spPr>
+                <a:xfrm>
+                  <a:off x="4807426" y="1536908"/>
+                  <a:ext cx="477951" cy="369332"/>
+                </a:xfrm>
+                <a:prstGeom prst="rect">
+                  <a:avLst/>
+                </a:prstGeom>
+                <a:blipFill>
+                  <a:blip r:embed="rId17"/>
+                  <a:stretch>
+                    <a:fillRect/>
+                  </a:stretch>
+                </a:blipFill>
+              </p:spPr>
+              <p:txBody>
+                <a:bodyPr/>
+                <a:lstStyle/>
+                <a:p>
+                  <a:r>
+                    <a:rPr lang="en-US">
+                      <a:noFill/>
+                    </a:rPr>
+                    <a:t> </a:t>
+                  </a:r>
+                </a:p>
+              </p:txBody>
+            </p:sp>
+          </mc:Fallback>
+        </mc:AlternateContent>
+        <mc:AlternateContent xmlns:mc="http://schemas.openxmlformats.org/markup-compatibility/2006">
+          <mc:Choice xmlns:a14="http://schemas.microsoft.com/office/drawing/2010/main" Requires="a14">
+            <p:sp>
+              <p:nvSpPr>
+                <p:cNvPr id="63" name="Rectangle 62">
+                  <a:extLst>
+                    <a:ext uri="{FF2B5EF4-FFF2-40B4-BE49-F238E27FC236}">
+                      <a16:creationId xmlns:a16="http://schemas.microsoft.com/office/drawing/2014/main" id="{14181F8F-DD87-004D-AE2B-B18A677D04AC}"/>
+                    </a:ext>
+                  </a:extLst>
+                </p:cNvPr>
+                <p:cNvSpPr/>
+                <p:nvPr/>
+              </p:nvSpPr>
+              <p:spPr>
+                <a:xfrm>
+                  <a:off x="4814684" y="2864962"/>
+                  <a:ext cx="472629" cy="369332"/>
+                </a:xfrm>
+                <a:prstGeom prst="rect">
+                  <a:avLst/>
+                </a:prstGeom>
+              </p:spPr>
+              <p:txBody>
+                <a:bodyPr wrap="none">
+                  <a:spAutoFit/>
+                </a:bodyPr>
+                <a:lstStyle/>
+                <a:p>
+                  <a14:m>
+                    <m:oMathPara xmlns:m="http://schemas.openxmlformats.org/officeDocument/2006/math">
+                      <m:oMathParaPr>
+                        <m:jc m:val="centerGroup"/>
+                      </m:oMathParaPr>
+                      <m:oMath xmlns:m="http://schemas.openxmlformats.org/officeDocument/2006/math">
+                        <m:sSub>
+                          <m:sSubPr>
+                            <m:ctrlPr>
+                              <a:rPr lang="en-US" b="0" i="1" smtClean="0">
+                                <a:latin typeface="Cambria Math" panose="02040503050406030204" pitchFamily="18" charset="0"/>
+                              </a:rPr>
+                            </m:ctrlPr>
+                          </m:sSubPr>
+                          <m:e>
+                            <m:r>
+                              <a:rPr lang="en-US" b="0" i="1" smtClean="0">
+                                <a:latin typeface="Cambria Math" panose="02040503050406030204" pitchFamily="18" charset="0"/>
+                              </a:rPr>
+                              <m:t>𝑑</m:t>
+                            </m:r>
+                          </m:e>
+                          <m:sub>
+                            <m:r>
+                              <a:rPr lang="en-US" b="0" i="1" smtClean="0">
+                                <a:latin typeface="Cambria Math" panose="02040503050406030204" pitchFamily="18" charset="0"/>
+                              </a:rPr>
+                              <m:t>1</m:t>
+                            </m:r>
+                          </m:sub>
+                        </m:sSub>
+                      </m:oMath>
+                    </m:oMathPara>
+                  </a14:m>
+                  <a:endParaRPr lang="en-US" dirty="0"/>
+                </a:p>
+              </p:txBody>
+            </p:sp>
+          </mc:Choice>
+          <mc:Fallback>
+            <p:sp>
+              <p:nvSpPr>
+                <p:cNvPr id="63" name="Rectangle 62">
+                  <a:extLst>
+                    <a:ext uri="{FF2B5EF4-FFF2-40B4-BE49-F238E27FC236}">
+                      <a16:creationId xmlns:a16="http://schemas.microsoft.com/office/drawing/2014/main" id="{14181F8F-DD87-004D-AE2B-B18A677D04AC}"/>
+                    </a:ext>
+                  </a:extLst>
+                </p:cNvPr>
+                <p:cNvSpPr>
+                  <a:spLocks noRot="1" noChangeAspect="1" noMove="1" noResize="1" noEditPoints="1" noAdjustHandles="1" noChangeArrowheads="1" noChangeShapeType="1" noTextEdit="1"/>
+                </p:cNvSpPr>
+                <p:nvPr/>
+              </p:nvSpPr>
+              <p:spPr>
+                <a:xfrm>
+                  <a:off x="4814684" y="2864962"/>
+                  <a:ext cx="472629" cy="369332"/>
+                </a:xfrm>
+                <a:prstGeom prst="rect">
+                  <a:avLst/>
+                </a:prstGeom>
+                <a:blipFill>
+                  <a:blip r:embed="rId18"/>
+                  <a:stretch>
+                    <a:fillRect/>
+                  </a:stretch>
+                </a:blipFill>
+              </p:spPr>
+              <p:txBody>
+                <a:bodyPr/>
+                <a:lstStyle/>
+                <a:p>
+                  <a:r>
+                    <a:rPr lang="en-US">
+                      <a:noFill/>
+                    </a:rPr>
+                    <a:t> </a:t>
+                  </a:r>
+                </a:p>
+              </p:txBody>
+            </p:sp>
+          </mc:Fallback>
+        </mc:AlternateContent>
+        <mc:AlternateContent xmlns:mc="http://schemas.openxmlformats.org/markup-compatibility/2006">
+          <mc:Choice xmlns:a14="http://schemas.microsoft.com/office/drawing/2010/main" Requires="a14">
+            <p:sp>
+              <p:nvSpPr>
+                <p:cNvPr id="64" name="Rectangle 63">
+                  <a:extLst>
+                    <a:ext uri="{FF2B5EF4-FFF2-40B4-BE49-F238E27FC236}">
+                      <a16:creationId xmlns:a16="http://schemas.microsoft.com/office/drawing/2014/main" id="{96466439-4806-E343-913F-E4BCDB8FB01E}"/>
+                    </a:ext>
+                  </a:extLst>
+                </p:cNvPr>
+                <p:cNvSpPr/>
+                <p:nvPr/>
+              </p:nvSpPr>
+              <p:spPr>
+                <a:xfrm>
+                  <a:off x="4807426" y="4219146"/>
+                  <a:ext cx="477951" cy="369332"/>
+                </a:xfrm>
+                <a:prstGeom prst="rect">
+                  <a:avLst/>
+                </a:prstGeom>
+              </p:spPr>
+              <p:txBody>
+                <a:bodyPr wrap="none">
+                  <a:spAutoFit/>
+                </a:bodyPr>
+                <a:lstStyle/>
+                <a:p>
+                  <a14:m>
+                    <m:oMathPara xmlns:m="http://schemas.openxmlformats.org/officeDocument/2006/math">
+                      <m:oMathParaPr>
+                        <m:jc m:val="centerGroup"/>
+                      </m:oMathParaPr>
+                      <m:oMath xmlns:m="http://schemas.openxmlformats.org/officeDocument/2006/math">
+                        <m:sSub>
+                          <m:sSubPr>
+                            <m:ctrlPr>
+                              <a:rPr lang="en-US" b="0" i="1" smtClean="0">
+                                <a:latin typeface="Cambria Math" panose="02040503050406030204" pitchFamily="18" charset="0"/>
+                              </a:rPr>
+                            </m:ctrlPr>
+                          </m:sSubPr>
+                          <m:e>
+                            <m:r>
+                              <a:rPr lang="en-US" b="0" i="1" smtClean="0">
+                                <a:latin typeface="Cambria Math" panose="02040503050406030204" pitchFamily="18" charset="0"/>
+                              </a:rPr>
+                              <m:t>𝑑</m:t>
+                            </m:r>
+                          </m:e>
+                          <m:sub>
+                            <m:r>
+                              <a:rPr lang="en-US" b="0" i="1" smtClean="0">
+                                <a:latin typeface="Cambria Math" panose="02040503050406030204" pitchFamily="18" charset="0"/>
+                              </a:rPr>
+                              <m:t>2</m:t>
+                            </m:r>
+                          </m:sub>
+                        </m:sSub>
+                      </m:oMath>
+                    </m:oMathPara>
+                  </a14:m>
+                  <a:endParaRPr lang="en-US" dirty="0"/>
+                </a:p>
+              </p:txBody>
+            </p:sp>
+          </mc:Choice>
+          <mc:Fallback>
+            <p:sp>
+              <p:nvSpPr>
+                <p:cNvPr id="64" name="Rectangle 63">
+                  <a:extLst>
+                    <a:ext uri="{FF2B5EF4-FFF2-40B4-BE49-F238E27FC236}">
+                      <a16:creationId xmlns:a16="http://schemas.microsoft.com/office/drawing/2014/main" id="{96466439-4806-E343-913F-E4BCDB8FB01E}"/>
+                    </a:ext>
+                  </a:extLst>
+                </p:cNvPr>
+                <p:cNvSpPr>
+                  <a:spLocks noRot="1" noChangeAspect="1" noMove="1" noResize="1" noEditPoints="1" noAdjustHandles="1" noChangeArrowheads="1" noChangeShapeType="1" noTextEdit="1"/>
+                </p:cNvSpPr>
+                <p:nvPr/>
+              </p:nvSpPr>
+              <p:spPr>
+                <a:xfrm>
+                  <a:off x="4807426" y="4219146"/>
+                  <a:ext cx="477951" cy="369332"/>
+                </a:xfrm>
+                <a:prstGeom prst="rect">
+                  <a:avLst/>
+                </a:prstGeom>
+                <a:blipFill>
+                  <a:blip r:embed="rId19"/>
+                  <a:stretch>
+                    <a:fillRect/>
+                  </a:stretch>
+                </a:blipFill>
+              </p:spPr>
+              <p:txBody>
+                <a:bodyPr/>
+                <a:lstStyle/>
+                <a:p>
+                  <a:r>
+                    <a:rPr lang="en-US">
+                      <a:noFill/>
+                    </a:rPr>
+                    <a:t> </a:t>
+                  </a:r>
+                </a:p>
+              </p:txBody>
+            </p:sp>
+          </mc:Fallback>
+        </mc:AlternateContent>
+        <mc:AlternateContent xmlns:mc="http://schemas.openxmlformats.org/markup-compatibility/2006">
+          <mc:Choice xmlns:a14="http://schemas.microsoft.com/office/drawing/2010/main" Requires="a14">
+            <p:sp>
+              <p:nvSpPr>
+                <p:cNvPr id="65" name="Rectangle 64">
+                  <a:extLst>
+                    <a:ext uri="{FF2B5EF4-FFF2-40B4-BE49-F238E27FC236}">
+                      <a16:creationId xmlns:a16="http://schemas.microsoft.com/office/drawing/2014/main" id="{B7F1344B-5998-6345-835E-79790EF5DCFD}"/>
+                    </a:ext>
+                  </a:extLst>
+                </p:cNvPr>
+                <p:cNvSpPr/>
+                <p:nvPr/>
+              </p:nvSpPr>
+              <p:spPr>
+                <a:xfrm>
+                  <a:off x="6231884" y="1539497"/>
+                  <a:ext cx="473143" cy="369332"/>
+                </a:xfrm>
+                <a:prstGeom prst="rect">
+                  <a:avLst/>
+                </a:prstGeom>
+              </p:spPr>
+              <p:txBody>
+                <a:bodyPr wrap="none">
+                  <a:spAutoFit/>
+                </a:bodyPr>
+                <a:lstStyle/>
+                <a:p>
+                  <a14:m>
+                    <m:oMathPara xmlns:m="http://schemas.openxmlformats.org/officeDocument/2006/math">
+                      <m:oMathParaPr>
+                        <m:jc m:val="centerGroup"/>
+                      </m:oMathParaPr>
+                      <m:oMath xmlns:m="http://schemas.openxmlformats.org/officeDocument/2006/math">
+                        <m:sSub>
+                          <m:sSubPr>
+                            <m:ctrlPr>
+                              <a:rPr lang="en-US" b="0" i="1" smtClean="0">
+                                <a:latin typeface="Cambria Math" panose="02040503050406030204" pitchFamily="18" charset="0"/>
+                              </a:rPr>
+                            </m:ctrlPr>
+                          </m:sSubPr>
+                          <m:e>
+                            <m:r>
+                              <a:rPr lang="en-US" b="0" i="1" smtClean="0">
+                                <a:latin typeface="Cambria Math" panose="02040503050406030204" pitchFamily="18" charset="0"/>
+                              </a:rPr>
+                              <m:t>h</m:t>
+                            </m:r>
+                          </m:e>
+                          <m:sub>
+                            <m:r>
+                              <a:rPr lang="en-US" b="0" i="1" smtClean="0">
+                                <a:latin typeface="Cambria Math" panose="02040503050406030204" pitchFamily="18" charset="0"/>
+                              </a:rPr>
+                              <m:t>0</m:t>
+                            </m:r>
+                          </m:sub>
+                        </m:sSub>
+                      </m:oMath>
+                    </m:oMathPara>
+                  </a14:m>
+                  <a:endParaRPr lang="en-US" dirty="0"/>
+                </a:p>
+              </p:txBody>
+            </p:sp>
+          </mc:Choice>
+          <mc:Fallback>
+            <p:sp>
+              <p:nvSpPr>
+                <p:cNvPr id="65" name="Rectangle 64">
+                  <a:extLst>
+                    <a:ext uri="{FF2B5EF4-FFF2-40B4-BE49-F238E27FC236}">
+                      <a16:creationId xmlns:a16="http://schemas.microsoft.com/office/drawing/2014/main" id="{B7F1344B-5998-6345-835E-79790EF5DCFD}"/>
+                    </a:ext>
+                  </a:extLst>
+                </p:cNvPr>
+                <p:cNvSpPr>
+                  <a:spLocks noRot="1" noChangeAspect="1" noMove="1" noResize="1" noEditPoints="1" noAdjustHandles="1" noChangeArrowheads="1" noChangeShapeType="1" noTextEdit="1"/>
+                </p:cNvSpPr>
+                <p:nvPr/>
+              </p:nvSpPr>
+              <p:spPr>
+                <a:xfrm>
+                  <a:off x="6231884" y="1539497"/>
+                  <a:ext cx="473143" cy="369332"/>
+                </a:xfrm>
+                <a:prstGeom prst="rect">
+                  <a:avLst/>
+                </a:prstGeom>
+                <a:blipFill>
+                  <a:blip r:embed="rId20"/>
+                  <a:stretch>
+                    <a:fillRect/>
+                  </a:stretch>
+                </a:blipFill>
+              </p:spPr>
+              <p:txBody>
+                <a:bodyPr/>
+                <a:lstStyle/>
+                <a:p>
+                  <a:r>
+                    <a:rPr lang="en-US">
+                      <a:noFill/>
+                    </a:rPr>
+                    <a:t> </a:t>
+                  </a:r>
+                </a:p>
+              </p:txBody>
+            </p:sp>
+          </mc:Fallback>
+        </mc:AlternateContent>
+        <mc:AlternateContent xmlns:mc="http://schemas.openxmlformats.org/markup-compatibility/2006">
+          <mc:Choice xmlns:a14="http://schemas.microsoft.com/office/drawing/2010/main" Requires="a14">
+            <p:sp>
+              <p:nvSpPr>
+                <p:cNvPr id="66" name="Rectangle 65">
+                  <a:extLst>
+                    <a:ext uri="{FF2B5EF4-FFF2-40B4-BE49-F238E27FC236}">
+                      <a16:creationId xmlns:a16="http://schemas.microsoft.com/office/drawing/2014/main" id="{B9DAAF69-7918-0542-9861-32D4AEF52B96}"/>
+                    </a:ext>
+                  </a:extLst>
+                </p:cNvPr>
+                <p:cNvSpPr/>
+                <p:nvPr/>
+              </p:nvSpPr>
+              <p:spPr>
+                <a:xfrm>
+                  <a:off x="6239142" y="2867551"/>
+                  <a:ext cx="467820" cy="369332"/>
+                </a:xfrm>
+                <a:prstGeom prst="rect">
+                  <a:avLst/>
+                </a:prstGeom>
+              </p:spPr>
+              <p:txBody>
+                <a:bodyPr wrap="none">
+                  <a:spAutoFit/>
+                </a:bodyPr>
+                <a:lstStyle/>
+                <a:p>
+                  <a14:m>
+                    <m:oMathPara xmlns:m="http://schemas.openxmlformats.org/officeDocument/2006/math">
+                      <m:oMathParaPr>
+                        <m:jc m:val="centerGroup"/>
+                      </m:oMathParaPr>
+                      <m:oMath xmlns:m="http://schemas.openxmlformats.org/officeDocument/2006/math">
+                        <m:sSub>
+                          <m:sSubPr>
+                            <m:ctrlPr>
+                              <a:rPr lang="en-US" b="0" i="1" smtClean="0">
+                                <a:latin typeface="Cambria Math" panose="02040503050406030204" pitchFamily="18" charset="0"/>
+                              </a:rPr>
+                            </m:ctrlPr>
+                          </m:sSubPr>
+                          <m:e>
+                            <m:r>
+                              <a:rPr lang="en-US" b="0" i="1" smtClean="0">
+                                <a:latin typeface="Cambria Math" panose="02040503050406030204" pitchFamily="18" charset="0"/>
+                              </a:rPr>
+                              <m:t>h</m:t>
+                            </m:r>
+                          </m:e>
+                          <m:sub>
+                            <m:r>
+                              <a:rPr lang="en-US" b="0" i="1" smtClean="0">
+                                <a:latin typeface="Cambria Math" panose="02040503050406030204" pitchFamily="18" charset="0"/>
+                              </a:rPr>
+                              <m:t>1</m:t>
+                            </m:r>
+                          </m:sub>
+                        </m:sSub>
+                      </m:oMath>
+                    </m:oMathPara>
+                  </a14:m>
+                  <a:endParaRPr lang="en-US" dirty="0"/>
+                </a:p>
+              </p:txBody>
+            </p:sp>
+          </mc:Choice>
+          <mc:Fallback>
+            <p:sp>
+              <p:nvSpPr>
+                <p:cNvPr id="66" name="Rectangle 65">
+                  <a:extLst>
+                    <a:ext uri="{FF2B5EF4-FFF2-40B4-BE49-F238E27FC236}">
+                      <a16:creationId xmlns:a16="http://schemas.microsoft.com/office/drawing/2014/main" id="{B9DAAF69-7918-0542-9861-32D4AEF52B96}"/>
+                    </a:ext>
+                  </a:extLst>
+                </p:cNvPr>
+                <p:cNvSpPr>
+                  <a:spLocks noRot="1" noChangeAspect="1" noMove="1" noResize="1" noEditPoints="1" noAdjustHandles="1" noChangeArrowheads="1" noChangeShapeType="1" noTextEdit="1"/>
+                </p:cNvSpPr>
+                <p:nvPr/>
+              </p:nvSpPr>
+              <p:spPr>
+                <a:xfrm>
+                  <a:off x="6239142" y="2867551"/>
+                  <a:ext cx="467820" cy="369332"/>
+                </a:xfrm>
+                <a:prstGeom prst="rect">
+                  <a:avLst/>
+                </a:prstGeom>
+                <a:blipFill>
+                  <a:blip r:embed="rId21"/>
+                  <a:stretch>
+                    <a:fillRect/>
+                  </a:stretch>
+                </a:blipFill>
+              </p:spPr>
+              <p:txBody>
+                <a:bodyPr/>
+                <a:lstStyle/>
+                <a:p>
+                  <a:r>
+                    <a:rPr lang="en-US">
+                      <a:noFill/>
+                    </a:rPr>
+                    <a:t> </a:t>
+                  </a:r>
+                </a:p>
+              </p:txBody>
+            </p:sp>
+          </mc:Fallback>
+        </mc:AlternateContent>
+        <mc:AlternateContent xmlns:mc="http://schemas.openxmlformats.org/markup-compatibility/2006">
+          <mc:Choice xmlns:a14="http://schemas.microsoft.com/office/drawing/2010/main" Requires="a14">
+            <p:sp>
+              <p:nvSpPr>
+                <p:cNvPr id="67" name="Rectangle 66">
+                  <a:extLst>
+                    <a:ext uri="{FF2B5EF4-FFF2-40B4-BE49-F238E27FC236}">
+                      <a16:creationId xmlns:a16="http://schemas.microsoft.com/office/drawing/2014/main" id="{FDFA8D93-6033-F44A-9A3D-337EDB5C4214}"/>
+                    </a:ext>
+                  </a:extLst>
+                </p:cNvPr>
+                <p:cNvSpPr/>
+                <p:nvPr/>
+              </p:nvSpPr>
+              <p:spPr>
+                <a:xfrm>
+                  <a:off x="6231884" y="4221735"/>
+                  <a:ext cx="473143" cy="369332"/>
+                </a:xfrm>
+                <a:prstGeom prst="rect">
+                  <a:avLst/>
+                </a:prstGeom>
+              </p:spPr>
+              <p:txBody>
+                <a:bodyPr wrap="none">
+                  <a:spAutoFit/>
+                </a:bodyPr>
+                <a:lstStyle/>
+                <a:p>
+                  <a14:m>
+                    <m:oMathPara xmlns:m="http://schemas.openxmlformats.org/officeDocument/2006/math">
+                      <m:oMathParaPr>
+                        <m:jc m:val="centerGroup"/>
+                      </m:oMathParaPr>
+                      <m:oMath xmlns:m="http://schemas.openxmlformats.org/officeDocument/2006/math">
+                        <m:sSub>
+                          <m:sSubPr>
+                            <m:ctrlPr>
+                              <a:rPr lang="en-US" b="0" i="1" smtClean="0">
+                                <a:latin typeface="Cambria Math" panose="02040503050406030204" pitchFamily="18" charset="0"/>
+                              </a:rPr>
+                            </m:ctrlPr>
+                          </m:sSubPr>
+                          <m:e>
+                            <m:r>
+                              <a:rPr lang="en-US" b="0" i="1" smtClean="0">
+                                <a:latin typeface="Cambria Math" panose="02040503050406030204" pitchFamily="18" charset="0"/>
+                              </a:rPr>
+                              <m:t>h</m:t>
+                            </m:r>
+                          </m:e>
+                          <m:sub>
+                            <m:r>
+                              <a:rPr lang="en-US" b="0" i="1" smtClean="0">
+                                <a:latin typeface="Cambria Math" panose="02040503050406030204" pitchFamily="18" charset="0"/>
+                              </a:rPr>
+                              <m:t>2</m:t>
+                            </m:r>
+                          </m:sub>
+                        </m:sSub>
+                      </m:oMath>
+                    </m:oMathPara>
+                  </a14:m>
+                  <a:endParaRPr lang="en-US" dirty="0"/>
+                </a:p>
+              </p:txBody>
+            </p:sp>
+          </mc:Choice>
+          <mc:Fallback>
+            <p:sp>
+              <p:nvSpPr>
+                <p:cNvPr id="67" name="Rectangle 66">
+                  <a:extLst>
+                    <a:ext uri="{FF2B5EF4-FFF2-40B4-BE49-F238E27FC236}">
+                      <a16:creationId xmlns:a16="http://schemas.microsoft.com/office/drawing/2014/main" id="{FDFA8D93-6033-F44A-9A3D-337EDB5C4214}"/>
+                    </a:ext>
+                  </a:extLst>
+                </p:cNvPr>
+                <p:cNvSpPr>
+                  <a:spLocks noRot="1" noChangeAspect="1" noMove="1" noResize="1" noEditPoints="1" noAdjustHandles="1" noChangeArrowheads="1" noChangeShapeType="1" noTextEdit="1"/>
+                </p:cNvSpPr>
+                <p:nvPr/>
+              </p:nvSpPr>
+              <p:spPr>
+                <a:xfrm>
+                  <a:off x="6231884" y="4221735"/>
+                  <a:ext cx="473143" cy="369332"/>
+                </a:xfrm>
+                <a:prstGeom prst="rect">
+                  <a:avLst/>
+                </a:prstGeom>
+                <a:blipFill>
+                  <a:blip r:embed="rId22"/>
+                  <a:stretch>
+                    <a:fillRect/>
+                  </a:stretch>
+                </a:blipFill>
+              </p:spPr>
+              <p:txBody>
+                <a:bodyPr/>
+                <a:lstStyle/>
+                <a:p>
+                  <a:r>
+                    <a:rPr lang="en-US">
+                      <a:noFill/>
+                    </a:rPr>
+                    <a:t> </a:t>
+                  </a:r>
+                </a:p>
+              </p:txBody>
+            </p:sp>
+          </mc:Fallback>
+        </mc:AlternateContent>
+        <mc:AlternateContent xmlns:mc="http://schemas.openxmlformats.org/markup-compatibility/2006">
+          <mc:Choice xmlns:a14="http://schemas.microsoft.com/office/drawing/2010/main" Requires="a14">
+            <p:sp>
+              <p:nvSpPr>
+                <p:cNvPr id="71" name="Rectangle 70">
+                  <a:extLst>
+                    <a:ext uri="{FF2B5EF4-FFF2-40B4-BE49-F238E27FC236}">
+                      <a16:creationId xmlns:a16="http://schemas.microsoft.com/office/drawing/2014/main" id="{7958F8E3-CEEA-CB4A-8B39-6F4B76CEDBFA}"/>
+                    </a:ext>
+                  </a:extLst>
+                </p:cNvPr>
+                <p:cNvSpPr/>
+                <p:nvPr/>
+              </p:nvSpPr>
+              <p:spPr>
+                <a:xfrm>
+                  <a:off x="7569712" y="1545797"/>
+                  <a:ext cx="428515" cy="369332"/>
+                </a:xfrm>
+                <a:prstGeom prst="rect">
+                  <a:avLst/>
+                </a:prstGeom>
+              </p:spPr>
+              <p:txBody>
+                <a:bodyPr wrap="none">
+                  <a:spAutoFit/>
+                </a:bodyPr>
+                <a:lstStyle/>
+                <a:p>
+                  <a14:m>
+                    <m:oMathPara xmlns:m="http://schemas.openxmlformats.org/officeDocument/2006/math">
+                      <m:oMathParaPr>
+                        <m:jc m:val="centerGroup"/>
+                      </m:oMathParaPr>
+                      <m:oMath xmlns:m="http://schemas.openxmlformats.org/officeDocument/2006/math">
+                        <m:sSub>
+                          <m:sSubPr>
+                            <m:ctrlPr>
+                              <a:rPr lang="en-US" b="0" i="1" smtClean="0">
+                                <a:latin typeface="Cambria Math" panose="02040503050406030204" pitchFamily="18" charset="0"/>
+                              </a:rPr>
+                            </m:ctrlPr>
+                          </m:sSubPr>
+                          <m:e>
+                            <m:r>
+                              <a:rPr lang="en-US" b="0" i="1" smtClean="0">
+                                <a:latin typeface="Cambria Math" panose="02040503050406030204" pitchFamily="18" charset="0"/>
+                              </a:rPr>
+                              <m:t>𝑟</m:t>
+                            </m:r>
+                          </m:e>
+                          <m:sub>
+                            <m:r>
+                              <a:rPr lang="en-US" b="0" i="1" smtClean="0">
+                                <a:latin typeface="Cambria Math" panose="02040503050406030204" pitchFamily="18" charset="0"/>
+                              </a:rPr>
+                              <m:t>0</m:t>
+                            </m:r>
+                          </m:sub>
+                        </m:sSub>
+                      </m:oMath>
+                    </m:oMathPara>
+                  </a14:m>
+                  <a:endParaRPr lang="en-US" dirty="0"/>
+                </a:p>
+              </p:txBody>
+            </p:sp>
+          </mc:Choice>
+          <mc:Fallback>
+            <p:sp>
+              <p:nvSpPr>
+                <p:cNvPr id="71" name="Rectangle 70">
+                  <a:extLst>
+                    <a:ext uri="{FF2B5EF4-FFF2-40B4-BE49-F238E27FC236}">
+                      <a16:creationId xmlns:a16="http://schemas.microsoft.com/office/drawing/2014/main" id="{7958F8E3-CEEA-CB4A-8B39-6F4B76CEDBFA}"/>
+                    </a:ext>
+                  </a:extLst>
+                </p:cNvPr>
+                <p:cNvSpPr>
+                  <a:spLocks noRot="1" noChangeAspect="1" noMove="1" noResize="1" noEditPoints="1" noAdjustHandles="1" noChangeArrowheads="1" noChangeShapeType="1" noTextEdit="1"/>
+                </p:cNvSpPr>
+                <p:nvPr/>
+              </p:nvSpPr>
+              <p:spPr>
+                <a:xfrm>
+                  <a:off x="7569712" y="1545797"/>
+                  <a:ext cx="428515" cy="369332"/>
+                </a:xfrm>
+                <a:prstGeom prst="rect">
+                  <a:avLst/>
+                </a:prstGeom>
+                <a:blipFill>
+                  <a:blip r:embed="rId23"/>
+                  <a:stretch>
+                    <a:fillRect/>
+                  </a:stretch>
+                </a:blipFill>
+              </p:spPr>
+              <p:txBody>
+                <a:bodyPr/>
+                <a:lstStyle/>
+                <a:p>
+                  <a:r>
+                    <a:rPr lang="en-US">
+                      <a:noFill/>
+                    </a:rPr>
+                    <a:t> </a:t>
+                  </a:r>
+                </a:p>
+              </p:txBody>
+            </p:sp>
+          </mc:Fallback>
+        </mc:AlternateContent>
+        <mc:AlternateContent xmlns:mc="http://schemas.openxmlformats.org/markup-compatibility/2006">
+          <mc:Choice xmlns:a14="http://schemas.microsoft.com/office/drawing/2010/main" Requires="a14">
+            <p:sp>
+              <p:nvSpPr>
+                <p:cNvPr id="72" name="Rectangle 71">
+                  <a:extLst>
+                    <a:ext uri="{FF2B5EF4-FFF2-40B4-BE49-F238E27FC236}">
+                      <a16:creationId xmlns:a16="http://schemas.microsoft.com/office/drawing/2014/main" id="{8B54424E-DF0E-EF49-ABD9-13ADD5080EC6}"/>
+                    </a:ext>
+                  </a:extLst>
+                </p:cNvPr>
+                <p:cNvSpPr/>
+                <p:nvPr/>
+              </p:nvSpPr>
+              <p:spPr>
+                <a:xfrm>
+                  <a:off x="7576970" y="2873851"/>
+                  <a:ext cx="423193" cy="369332"/>
+                </a:xfrm>
+                <a:prstGeom prst="rect">
+                  <a:avLst/>
+                </a:prstGeom>
+              </p:spPr>
+              <p:txBody>
+                <a:bodyPr wrap="none">
+                  <a:spAutoFit/>
+                </a:bodyPr>
+                <a:lstStyle/>
+                <a:p>
+                  <a14:m>
+                    <m:oMathPara xmlns:m="http://schemas.openxmlformats.org/officeDocument/2006/math">
+                      <m:oMathParaPr>
+                        <m:jc m:val="centerGroup"/>
+                      </m:oMathParaPr>
+                      <m:oMath xmlns:m="http://schemas.openxmlformats.org/officeDocument/2006/math">
+                        <m:sSub>
+                          <m:sSubPr>
+                            <m:ctrlPr>
+                              <a:rPr lang="en-US" b="0" i="1" smtClean="0">
+                                <a:latin typeface="Cambria Math" panose="02040503050406030204" pitchFamily="18" charset="0"/>
+                              </a:rPr>
+                            </m:ctrlPr>
+                          </m:sSubPr>
+                          <m:e>
+                            <m:r>
+                              <a:rPr lang="en-US" b="0" i="1" smtClean="0">
+                                <a:latin typeface="Cambria Math" panose="02040503050406030204" pitchFamily="18" charset="0"/>
+                              </a:rPr>
+                              <m:t>𝑟</m:t>
+                            </m:r>
+                          </m:e>
+                          <m:sub>
+                            <m:r>
+                              <a:rPr lang="en-US" b="0" i="1" smtClean="0">
+                                <a:latin typeface="Cambria Math" panose="02040503050406030204" pitchFamily="18" charset="0"/>
+                              </a:rPr>
+                              <m:t>1</m:t>
+                            </m:r>
+                          </m:sub>
+                        </m:sSub>
+                      </m:oMath>
+                    </m:oMathPara>
+                  </a14:m>
+                  <a:endParaRPr lang="en-US" dirty="0"/>
+                </a:p>
+              </p:txBody>
+            </p:sp>
+          </mc:Choice>
+          <mc:Fallback>
+            <p:sp>
+              <p:nvSpPr>
+                <p:cNvPr id="72" name="Rectangle 71">
+                  <a:extLst>
+                    <a:ext uri="{FF2B5EF4-FFF2-40B4-BE49-F238E27FC236}">
+                      <a16:creationId xmlns:a16="http://schemas.microsoft.com/office/drawing/2014/main" id="{8B54424E-DF0E-EF49-ABD9-13ADD5080EC6}"/>
+                    </a:ext>
+                  </a:extLst>
+                </p:cNvPr>
+                <p:cNvSpPr>
+                  <a:spLocks noRot="1" noChangeAspect="1" noMove="1" noResize="1" noEditPoints="1" noAdjustHandles="1" noChangeArrowheads="1" noChangeShapeType="1" noTextEdit="1"/>
+                </p:cNvSpPr>
+                <p:nvPr/>
+              </p:nvSpPr>
+              <p:spPr>
+                <a:xfrm>
+                  <a:off x="7576970" y="2873851"/>
+                  <a:ext cx="423193" cy="369332"/>
+                </a:xfrm>
+                <a:prstGeom prst="rect">
+                  <a:avLst/>
+                </a:prstGeom>
+                <a:blipFill>
+                  <a:blip r:embed="rId24"/>
+                  <a:stretch>
+                    <a:fillRect/>
+                  </a:stretch>
+                </a:blipFill>
+              </p:spPr>
+              <p:txBody>
+                <a:bodyPr/>
+                <a:lstStyle/>
+                <a:p>
+                  <a:r>
+                    <a:rPr lang="en-US">
+                      <a:noFill/>
+                    </a:rPr>
+                    <a:t> </a:t>
+                  </a:r>
+                </a:p>
+              </p:txBody>
+            </p:sp>
+          </mc:Fallback>
+        </mc:AlternateContent>
+        <mc:AlternateContent xmlns:mc="http://schemas.openxmlformats.org/markup-compatibility/2006">
+          <mc:Choice xmlns:a14="http://schemas.microsoft.com/office/drawing/2010/main" Requires="a14">
+            <p:sp>
+              <p:nvSpPr>
+                <p:cNvPr id="73" name="Rectangle 72">
+                  <a:extLst>
+                    <a:ext uri="{FF2B5EF4-FFF2-40B4-BE49-F238E27FC236}">
+                      <a16:creationId xmlns:a16="http://schemas.microsoft.com/office/drawing/2014/main" id="{9D008693-662C-284D-ACBF-774A49726CC8}"/>
+                    </a:ext>
+                  </a:extLst>
+                </p:cNvPr>
+                <p:cNvSpPr/>
+                <p:nvPr/>
+              </p:nvSpPr>
+              <p:spPr>
+                <a:xfrm>
+                  <a:off x="7569712" y="4228035"/>
+                  <a:ext cx="428515" cy="369332"/>
+                </a:xfrm>
+                <a:prstGeom prst="rect">
+                  <a:avLst/>
+                </a:prstGeom>
+              </p:spPr>
+              <p:txBody>
+                <a:bodyPr wrap="none">
+                  <a:spAutoFit/>
+                </a:bodyPr>
+                <a:lstStyle/>
+                <a:p>
+                  <a14:m>
+                    <m:oMathPara xmlns:m="http://schemas.openxmlformats.org/officeDocument/2006/math">
+                      <m:oMathParaPr>
+                        <m:jc m:val="centerGroup"/>
+                      </m:oMathParaPr>
+                      <m:oMath xmlns:m="http://schemas.openxmlformats.org/officeDocument/2006/math">
+                        <m:sSub>
+                          <m:sSubPr>
+                            <m:ctrlPr>
+                              <a:rPr lang="en-US" b="0" i="1" smtClean="0">
+                                <a:latin typeface="Cambria Math" panose="02040503050406030204" pitchFamily="18" charset="0"/>
+                              </a:rPr>
+                            </m:ctrlPr>
+                          </m:sSubPr>
+                          <m:e>
+                            <m:r>
+                              <a:rPr lang="en-US" b="0" i="1" smtClean="0">
+                                <a:latin typeface="Cambria Math" panose="02040503050406030204" pitchFamily="18" charset="0"/>
+                              </a:rPr>
+                              <m:t>𝑟</m:t>
+                            </m:r>
+                          </m:e>
+                          <m:sub>
+                            <m:r>
+                              <a:rPr lang="en-US" b="0" i="1" smtClean="0">
+                                <a:latin typeface="Cambria Math" panose="02040503050406030204" pitchFamily="18" charset="0"/>
+                              </a:rPr>
+                              <m:t>2</m:t>
+                            </m:r>
+                          </m:sub>
+                        </m:sSub>
+                      </m:oMath>
+                    </m:oMathPara>
+                  </a14:m>
+                  <a:endParaRPr lang="en-US" dirty="0"/>
+                </a:p>
+              </p:txBody>
+            </p:sp>
+          </mc:Choice>
+          <mc:Fallback>
+            <p:sp>
+              <p:nvSpPr>
+                <p:cNvPr id="73" name="Rectangle 72">
+                  <a:extLst>
+                    <a:ext uri="{FF2B5EF4-FFF2-40B4-BE49-F238E27FC236}">
+                      <a16:creationId xmlns:a16="http://schemas.microsoft.com/office/drawing/2014/main" id="{9D008693-662C-284D-ACBF-774A49726CC8}"/>
+                    </a:ext>
+                  </a:extLst>
+                </p:cNvPr>
+                <p:cNvSpPr>
+                  <a:spLocks noRot="1" noChangeAspect="1" noMove="1" noResize="1" noEditPoints="1" noAdjustHandles="1" noChangeArrowheads="1" noChangeShapeType="1" noTextEdit="1"/>
+                </p:cNvSpPr>
+                <p:nvPr/>
+              </p:nvSpPr>
+              <p:spPr>
+                <a:xfrm>
+                  <a:off x="7569712" y="4228035"/>
+                  <a:ext cx="428515" cy="369332"/>
+                </a:xfrm>
+                <a:prstGeom prst="rect">
+                  <a:avLst/>
+                </a:prstGeom>
+                <a:blipFill>
+                  <a:blip r:embed="rId25"/>
+                  <a:stretch>
+                    <a:fillRect/>
+                  </a:stretch>
+                </a:blipFill>
+              </p:spPr>
+              <p:txBody>
+                <a:bodyPr/>
+                <a:lstStyle/>
+                <a:p>
+                  <a:r>
+                    <a:rPr lang="en-US">
+                      <a:noFill/>
+                    </a:rPr>
+                    <a:t> </a:t>
+                  </a:r>
+                </a:p>
+              </p:txBody>
+            </p:sp>
+          </mc:Fallback>
+        </mc:AlternateContent>
+        <mc:AlternateContent xmlns:mc="http://schemas.openxmlformats.org/markup-compatibility/2006">
+          <mc:Choice xmlns:a14="http://schemas.microsoft.com/office/drawing/2010/main" Requires="a14">
+            <p:sp>
+              <p:nvSpPr>
+                <p:cNvPr id="74" name="Rectangle 73">
+                  <a:extLst>
+                    <a:ext uri="{FF2B5EF4-FFF2-40B4-BE49-F238E27FC236}">
+                      <a16:creationId xmlns:a16="http://schemas.microsoft.com/office/drawing/2014/main" id="{42C8C050-DA9B-8E40-87DA-41AF1ED95E1C}"/>
+                    </a:ext>
+                  </a:extLst>
+                </p:cNvPr>
+                <p:cNvSpPr/>
+                <p:nvPr/>
+              </p:nvSpPr>
+              <p:spPr>
+                <a:xfrm>
+                  <a:off x="4307351" y="2380167"/>
+                  <a:ext cx="459035" cy="369332"/>
+                </a:xfrm>
+                <a:prstGeom prst="rect">
+                  <a:avLst/>
+                </a:prstGeom>
+              </p:spPr>
+              <p:txBody>
+                <a:bodyPr wrap="none">
+                  <a:spAutoFit/>
+                </a:bodyPr>
+                <a:lstStyle/>
+                <a:p>
+                  <a14:m>
+                    <m:oMathPara xmlns:m="http://schemas.openxmlformats.org/officeDocument/2006/math">
+                      <m:oMathParaPr>
+                        <m:jc m:val="centerGroup"/>
+                      </m:oMathParaPr>
+                      <m:oMath xmlns:m="http://schemas.openxmlformats.org/officeDocument/2006/math">
+                        <m:sSub>
+                          <m:sSubPr>
+                            <m:ctrlPr>
+                              <a:rPr lang="en-US" b="0" i="1" smtClean="0">
+                                <a:latin typeface="Cambria Math" panose="02040503050406030204" pitchFamily="18" charset="0"/>
+                              </a:rPr>
+                            </m:ctrlPr>
+                          </m:sSubPr>
+                          <m:e>
+                            <m:r>
+                              <a:rPr lang="en-US" b="0" i="1" smtClean="0">
+                                <a:latin typeface="Cambria Math" panose="02040503050406030204" pitchFamily="18" charset="0"/>
+                              </a:rPr>
+                              <m:t>𝛾</m:t>
+                            </m:r>
+                          </m:e>
+                          <m:sub>
+                            <m:r>
+                              <a:rPr lang="en-US" b="0" i="1" smtClean="0">
+                                <a:latin typeface="Cambria Math" panose="02040503050406030204" pitchFamily="18" charset="0"/>
+                              </a:rPr>
+                              <m:t>0</m:t>
+                            </m:r>
+                          </m:sub>
+                        </m:sSub>
+                      </m:oMath>
+                    </m:oMathPara>
+                  </a14:m>
+                  <a:endParaRPr lang="en-US" dirty="0"/>
+                </a:p>
+              </p:txBody>
+            </p:sp>
+          </mc:Choice>
+          <mc:Fallback>
+            <p:sp>
+              <p:nvSpPr>
+                <p:cNvPr id="74" name="Rectangle 73">
+                  <a:extLst>
+                    <a:ext uri="{FF2B5EF4-FFF2-40B4-BE49-F238E27FC236}">
+                      <a16:creationId xmlns:a16="http://schemas.microsoft.com/office/drawing/2014/main" id="{42C8C050-DA9B-8E40-87DA-41AF1ED95E1C}"/>
+                    </a:ext>
+                  </a:extLst>
+                </p:cNvPr>
+                <p:cNvSpPr>
+                  <a:spLocks noRot="1" noChangeAspect="1" noMove="1" noResize="1" noEditPoints="1" noAdjustHandles="1" noChangeArrowheads="1" noChangeShapeType="1" noTextEdit="1"/>
+                </p:cNvSpPr>
+                <p:nvPr/>
+              </p:nvSpPr>
+              <p:spPr>
+                <a:xfrm>
+                  <a:off x="4307351" y="2380167"/>
+                  <a:ext cx="459035" cy="369332"/>
+                </a:xfrm>
+                <a:prstGeom prst="rect">
+                  <a:avLst/>
+                </a:prstGeom>
+                <a:blipFill>
+                  <a:blip r:embed="rId26"/>
+                  <a:stretch>
+                    <a:fillRect b="-3333"/>
+                  </a:stretch>
+                </a:blipFill>
+              </p:spPr>
+              <p:txBody>
+                <a:bodyPr/>
+                <a:lstStyle/>
+                <a:p>
+                  <a:r>
+                    <a:rPr lang="en-US">
+                      <a:noFill/>
+                    </a:rPr>
+                    <a:t> </a:t>
+                  </a:r>
+                </a:p>
+              </p:txBody>
+            </p:sp>
+          </mc:Fallback>
+        </mc:AlternateContent>
+        <mc:AlternateContent xmlns:mc="http://schemas.openxmlformats.org/markup-compatibility/2006">
+          <mc:Choice xmlns:a14="http://schemas.microsoft.com/office/drawing/2010/main" Requires="a14">
+            <p:sp>
+              <p:nvSpPr>
+                <p:cNvPr id="75" name="Rectangle 74">
+                  <a:extLst>
+                    <a:ext uri="{FF2B5EF4-FFF2-40B4-BE49-F238E27FC236}">
+                      <a16:creationId xmlns:a16="http://schemas.microsoft.com/office/drawing/2014/main" id="{9153F7C0-56BD-8548-B927-C5FF7EB0BBD3}"/>
+                    </a:ext>
+                  </a:extLst>
+                </p:cNvPr>
+                <p:cNvSpPr/>
+                <p:nvPr/>
+              </p:nvSpPr>
+              <p:spPr>
+                <a:xfrm>
+                  <a:off x="4299790" y="3693429"/>
+                  <a:ext cx="453714" cy="369332"/>
+                </a:xfrm>
+                <a:prstGeom prst="rect">
+                  <a:avLst/>
+                </a:prstGeom>
+              </p:spPr>
+              <p:txBody>
+                <a:bodyPr wrap="none">
+                  <a:spAutoFit/>
+                </a:bodyPr>
+                <a:lstStyle/>
+                <a:p>
+                  <a14:m>
+                    <m:oMathPara xmlns:m="http://schemas.openxmlformats.org/officeDocument/2006/math">
+                      <m:oMathParaPr>
+                        <m:jc m:val="centerGroup"/>
+                      </m:oMathParaPr>
+                      <m:oMath xmlns:m="http://schemas.openxmlformats.org/officeDocument/2006/math">
+                        <m:sSub>
+                          <m:sSubPr>
+                            <m:ctrlPr>
+                              <a:rPr lang="en-US" b="0" i="1" smtClean="0">
+                                <a:latin typeface="Cambria Math" panose="02040503050406030204" pitchFamily="18" charset="0"/>
+                              </a:rPr>
+                            </m:ctrlPr>
+                          </m:sSubPr>
+                          <m:e>
+                            <m:r>
+                              <a:rPr lang="en-US" b="0" i="1" smtClean="0">
+                                <a:latin typeface="Cambria Math" panose="02040503050406030204" pitchFamily="18" charset="0"/>
+                              </a:rPr>
+                              <m:t>𝛾</m:t>
+                            </m:r>
+                          </m:e>
+                          <m:sub>
+                            <m:r>
+                              <a:rPr lang="en-US" b="0" i="1" smtClean="0">
+                                <a:latin typeface="Cambria Math" panose="02040503050406030204" pitchFamily="18" charset="0"/>
+                              </a:rPr>
+                              <m:t>1</m:t>
+                            </m:r>
+                          </m:sub>
+                        </m:sSub>
+                      </m:oMath>
+                    </m:oMathPara>
+                  </a14:m>
+                  <a:endParaRPr lang="en-US" dirty="0"/>
+                </a:p>
+              </p:txBody>
+            </p:sp>
+          </mc:Choice>
+          <mc:Fallback>
+            <p:sp>
+              <p:nvSpPr>
+                <p:cNvPr id="75" name="Rectangle 74">
+                  <a:extLst>
+                    <a:ext uri="{FF2B5EF4-FFF2-40B4-BE49-F238E27FC236}">
+                      <a16:creationId xmlns:a16="http://schemas.microsoft.com/office/drawing/2014/main" id="{9153F7C0-56BD-8548-B927-C5FF7EB0BBD3}"/>
+                    </a:ext>
+                  </a:extLst>
+                </p:cNvPr>
+                <p:cNvSpPr>
+                  <a:spLocks noRot="1" noChangeAspect="1" noMove="1" noResize="1" noEditPoints="1" noAdjustHandles="1" noChangeArrowheads="1" noChangeShapeType="1" noTextEdit="1"/>
+                </p:cNvSpPr>
+                <p:nvPr/>
+              </p:nvSpPr>
+              <p:spPr>
+                <a:xfrm>
+                  <a:off x="4299790" y="3693429"/>
+                  <a:ext cx="453714" cy="369332"/>
+                </a:xfrm>
+                <a:prstGeom prst="rect">
+                  <a:avLst/>
+                </a:prstGeom>
+                <a:blipFill>
+                  <a:blip r:embed="rId27"/>
+                  <a:stretch>
+                    <a:fillRect b="-6667"/>
+                  </a:stretch>
+                </a:blipFill>
+              </p:spPr>
+              <p:txBody>
+                <a:bodyPr/>
+                <a:lstStyle/>
+                <a:p>
+                  <a:r>
+                    <a:rPr lang="en-US">
+                      <a:noFill/>
+                    </a:rPr>
+                    <a:t> </a:t>
+                  </a:r>
+                </a:p>
+              </p:txBody>
+            </p:sp>
+          </mc:Fallback>
+        </mc:AlternateContent>
+        <mc:AlternateContent xmlns:mc="http://schemas.openxmlformats.org/markup-compatibility/2006">
+          <mc:Choice xmlns:a14="http://schemas.microsoft.com/office/drawing/2010/main" Requires="a14">
+            <p:sp>
+              <p:nvSpPr>
+                <p:cNvPr id="76" name="Rectangle 75">
+                  <a:extLst>
+                    <a:ext uri="{FF2B5EF4-FFF2-40B4-BE49-F238E27FC236}">
+                      <a16:creationId xmlns:a16="http://schemas.microsoft.com/office/drawing/2014/main" id="{2E72EDFA-BBD8-7B41-B99C-5FB28CAFE531}"/>
+                    </a:ext>
+                  </a:extLst>
+                </p:cNvPr>
+                <p:cNvSpPr/>
+                <p:nvPr/>
+              </p:nvSpPr>
+              <p:spPr>
+                <a:xfrm>
+                  <a:off x="2327686" y="600321"/>
+                  <a:ext cx="537263" cy="369332"/>
+                </a:xfrm>
+                <a:prstGeom prst="rect">
+                  <a:avLst/>
+                </a:prstGeom>
+              </p:spPr>
+              <p:txBody>
+                <a:bodyPr wrap="none">
+                  <a:spAutoFit/>
+                </a:bodyPr>
+                <a:lstStyle/>
+                <a:p>
+                  <a14:m>
+                    <m:oMathPara xmlns:m="http://schemas.openxmlformats.org/officeDocument/2006/math">
+                      <m:oMathParaPr>
+                        <m:jc m:val="centerGroup"/>
+                      </m:oMathParaPr>
+                      <m:oMath xmlns:m="http://schemas.openxmlformats.org/officeDocument/2006/math">
+                        <m:sSub>
+                          <m:sSubPr>
+                            <m:ctrlPr>
+                              <a:rPr lang="en-US" b="0" i="1" smtClean="0">
+                                <a:latin typeface="Cambria Math" panose="02040503050406030204" pitchFamily="18" charset="0"/>
+                              </a:rPr>
+                            </m:ctrlPr>
+                          </m:sSubPr>
+                          <m:e>
+                            <m:r>
+                              <a:rPr lang="en-US" b="0" i="1" smtClean="0">
+                                <a:latin typeface="Cambria Math" panose="02040503050406030204" pitchFamily="18" charset="0"/>
+                              </a:rPr>
+                              <m:t>𝑑</m:t>
+                            </m:r>
+                          </m:e>
+                          <m:sub>
+                            <m:r>
+                              <a:rPr lang="en-US" b="0" i="1" smtClean="0">
+                                <a:latin typeface="Cambria Math" panose="02040503050406030204" pitchFamily="18" charset="0"/>
+                              </a:rPr>
+                              <m:t>0</m:t>
+                            </m:r>
+                          </m:sub>
+                        </m:sSub>
+                        <m:r>
+                          <a:rPr lang="en-US" b="0" i="1" smtClean="0">
+                            <a:latin typeface="Cambria Math" panose="02040503050406030204" pitchFamily="18" charset="0"/>
+                          </a:rPr>
+                          <m:t>′</m:t>
+                        </m:r>
+                      </m:oMath>
+                    </m:oMathPara>
+                  </a14:m>
+                  <a:endParaRPr lang="en-US" dirty="0"/>
+                </a:p>
+              </p:txBody>
+            </p:sp>
+          </mc:Choice>
+          <mc:Fallback>
+            <p:sp>
+              <p:nvSpPr>
+                <p:cNvPr id="76" name="Rectangle 75">
+                  <a:extLst>
+                    <a:ext uri="{FF2B5EF4-FFF2-40B4-BE49-F238E27FC236}">
+                      <a16:creationId xmlns:a16="http://schemas.microsoft.com/office/drawing/2014/main" id="{2E72EDFA-BBD8-7B41-B99C-5FB28CAFE531}"/>
+                    </a:ext>
+                  </a:extLst>
+                </p:cNvPr>
+                <p:cNvSpPr>
+                  <a:spLocks noRot="1" noChangeAspect="1" noMove="1" noResize="1" noEditPoints="1" noAdjustHandles="1" noChangeArrowheads="1" noChangeShapeType="1" noTextEdit="1"/>
+                </p:cNvSpPr>
+                <p:nvPr/>
+              </p:nvSpPr>
+              <p:spPr>
+                <a:xfrm>
+                  <a:off x="2327686" y="600321"/>
+                  <a:ext cx="537263" cy="369332"/>
+                </a:xfrm>
+                <a:prstGeom prst="rect">
+                  <a:avLst/>
+                </a:prstGeom>
+                <a:blipFill>
+                  <a:blip r:embed="rId28"/>
+                  <a:stretch>
+                    <a:fillRect/>
+                  </a:stretch>
+                </a:blipFill>
+              </p:spPr>
+              <p:txBody>
+                <a:bodyPr/>
+                <a:lstStyle/>
+                <a:p>
+                  <a:r>
+                    <a:rPr lang="en-US">
+                      <a:noFill/>
+                    </a:rPr>
+                    <a:t> </a:t>
+                  </a:r>
+                </a:p>
+              </p:txBody>
+            </p:sp>
+          </mc:Fallback>
+        </mc:AlternateContent>
+        <p:sp>
+          <p:nvSpPr>
+            <p:cNvPr id="29" name="Rounded Rectangle 28">
+              <a:extLst>
+                <a:ext uri="{FF2B5EF4-FFF2-40B4-BE49-F238E27FC236}">
+                  <a16:creationId xmlns:a16="http://schemas.microsoft.com/office/drawing/2014/main" id="{D130219D-986F-654B-99B5-6B4C1F0F57EE}"/>
+                </a:ext>
+              </a:extLst>
+            </p:cNvPr>
+            <p:cNvSpPr/>
+            <p:nvPr/>
+          </p:nvSpPr>
+          <p:spPr>
+            <a:xfrm>
+              <a:off x="2290181" y="1204018"/>
+              <a:ext cx="2594610" cy="4057650"/>
+            </a:xfrm>
+            <a:prstGeom prst="roundRect">
+              <a:avLst/>
+            </a:prstGeom>
+            <a:solidFill>
+              <a:srgbClr val="C00000">
+                <a:alpha val="26000"/>
+              </a:srgbClr>
+            </a:solidFill>
+            <a:ln>
+              <a:noFill/>
+            </a:ln>
+          </p:spPr>
+          <p:style>
+            <a:lnRef idx="2">
+              <a:schemeClr val="accent1">
+                <a:shade val="50000"/>
+              </a:schemeClr>
+            </a:lnRef>
+            <a:fillRef idx="1">
+              <a:schemeClr val="accent1"/>
+            </a:fillRef>
+            <a:effectRef idx="0">
+              <a:schemeClr val="accent1"/>
+            </a:effectRef>
+            <a:fontRef idx="minor">
+              <a:schemeClr val="lt1"/>
+            </a:fontRef>
+          </p:style>
+          <p:txBody>
+            <a:bodyPr rtlCol="0" anchor="ctr"/>
+            <a:lstStyle/>
+            <a:p>
+              <a:pPr algn="ctr"/>
+              <a:endParaRPr lang="en-US" dirty="0"/>
+            </a:p>
+          </p:txBody>
+        </p:sp>
+      </p:grpSp>
+    </p:spTree>
+    <p:extLst>
+      <p:ext uri="{BB962C8B-B14F-4D97-AF65-F5344CB8AC3E}">
+        <p14:creationId xmlns:p14="http://schemas.microsoft.com/office/powerpoint/2010/main" val="916276367"/>
+      </p:ext>
+    </p:extLst>
+  </p:cSld>
+  <p:clrMapOvr>
+    <a:masterClrMapping/>
+  </p:clrMapOvr>
+</p:sld>
+</file>
+
+<file path=ppt/slides/slide16.xml><?xml version="1.0" encoding="utf-8"?>
+<p:sld xmlns:a="http://schemas.openxmlformats.org/drawingml/2006/main" xmlns:r="http://schemas.openxmlformats.org/officeDocument/2006/relationships" xmlns:p="http://schemas.openxmlformats.org/presentationml/2006/main">
+  <p:cSld>
+    <p:spTree>
+      <p:nvGrpSpPr>
+        <p:cNvPr id="1" name=""/>
+        <p:cNvGrpSpPr/>
+        <p:nvPr/>
+      </p:nvGrpSpPr>
+      <p:grpSpPr>
+        <a:xfrm>
+          <a:off x="0" y="0"/>
+          <a:ext cx="0" cy="0"/>
+          <a:chOff x="0" y="0"/>
+          <a:chExt cx="0" cy="0"/>
+        </a:xfrm>
+      </p:grpSpPr>
       <mc:AlternateContent xmlns:mc="http://schemas.openxmlformats.org/markup-compatibility/2006" xmlns:a14="http://schemas.microsoft.com/office/drawing/2010/main">
         <mc:Choice Requires="a14">
           <p:sp>
@@ -10491,7 +14716,7 @@
 </p:sld>
 </file>
 
-<file path=ppt/slides/slide16.xml><?xml version="1.0" encoding="utf-8"?>
+<file path=ppt/slides/slide17.xml><?xml version="1.0" encoding="utf-8"?>
 <p:sld xmlns:a="http://schemas.openxmlformats.org/drawingml/2006/main" xmlns:r="http://schemas.openxmlformats.org/officeDocument/2006/relationships" xmlns:p="http://schemas.openxmlformats.org/presentationml/2006/main">
   <p:cSld>
     <p:spTree>
@@ -10803,7 +15028,7 @@
 </p:sld>
 </file>
 
-<file path=ppt/slides/slide17.xml><?xml version="1.0" encoding="utf-8"?>
+<file path=ppt/slides/slide18.xml><?xml version="1.0" encoding="utf-8"?>
 <p:sld xmlns:a="http://schemas.openxmlformats.org/drawingml/2006/main" xmlns:r="http://schemas.openxmlformats.org/officeDocument/2006/relationships" xmlns:p="http://schemas.openxmlformats.org/presentationml/2006/main">
   <p:cSld>
     <p:spTree>
@@ -11465,7 +15690,7 @@
 </p:sld>
 </file>
 
-<file path=ppt/slides/slide18.xml><?xml version="1.0" encoding="utf-8"?>
+<file path=ppt/slides/slide19.xml><?xml version="1.0" encoding="utf-8"?>
 <p:sld xmlns:a="http://schemas.openxmlformats.org/drawingml/2006/main" xmlns:r="http://schemas.openxmlformats.org/officeDocument/2006/relationships" xmlns:p="http://schemas.openxmlformats.org/presentationml/2006/main">
   <p:cSld>
     <p:spTree>
@@ -11766,7 +15991,132 @@
 </p:sld>
 </file>
 
-<file path=ppt/slides/slide19.xml><?xml version="1.0" encoding="utf-8"?>
+<file path=ppt/slides/slide2.xml><?xml version="1.0" encoding="utf-8"?>
+<p:sld xmlns:a="http://schemas.openxmlformats.org/drawingml/2006/main" xmlns:r="http://schemas.openxmlformats.org/officeDocument/2006/relationships" xmlns:p="http://schemas.openxmlformats.org/presentationml/2006/main">
+  <p:cSld>
+    <p:spTree>
+      <p:nvGrpSpPr>
+        <p:cNvPr id="1" name=""/>
+        <p:cNvGrpSpPr/>
+        <p:nvPr/>
+      </p:nvGrpSpPr>
+      <p:grpSpPr>
+        <a:xfrm>
+          <a:off x="0" y="0"/>
+          <a:ext cx="0" cy="0"/>
+          <a:chOff x="0" y="0"/>
+          <a:chExt cx="0" cy="0"/>
+        </a:xfrm>
+      </p:grpSpPr>
+      <p:sp>
+        <p:nvSpPr>
+          <p:cNvPr id="2" name="Title 1">
+            <a:extLst>
+              <a:ext uri="{FF2B5EF4-FFF2-40B4-BE49-F238E27FC236}">
+                <a16:creationId xmlns:a16="http://schemas.microsoft.com/office/drawing/2014/main" id="{000B5B19-0E3C-8A49-934B-01961D5DB014}"/>
+              </a:ext>
+            </a:extLst>
+          </p:cNvPr>
+          <p:cNvSpPr>
+            <a:spLocks noGrp="1"/>
+          </p:cNvSpPr>
+          <p:nvPr>
+            <p:ph type="title"/>
+          </p:nvPr>
+        </p:nvSpPr>
+        <p:spPr/>
+        <p:txBody>
+          <a:bodyPr/>
+          <a:lstStyle/>
+          <a:p>
+            <a:r>
+              <a:rPr lang="en-US" dirty="0"/>
+              <a:t>Questions</a:t>
+            </a:r>
+          </a:p>
+        </p:txBody>
+      </p:sp>
+      <p:sp>
+        <p:nvSpPr>
+          <p:cNvPr id="3" name="Content Placeholder 2">
+            <a:extLst>
+              <a:ext uri="{FF2B5EF4-FFF2-40B4-BE49-F238E27FC236}">
+                <a16:creationId xmlns:a16="http://schemas.microsoft.com/office/drawing/2014/main" id="{A64E80B4-1E36-4F45-B98B-D8D78A6A7AA2}"/>
+              </a:ext>
+            </a:extLst>
+          </p:cNvPr>
+          <p:cNvSpPr>
+            <a:spLocks noGrp="1"/>
+          </p:cNvSpPr>
+          <p:nvPr>
+            <p:ph idx="1"/>
+          </p:nvPr>
+        </p:nvSpPr>
+        <p:spPr/>
+        <p:txBody>
+          <a:bodyPr/>
+          <a:lstStyle/>
+          <a:p>
+            <a:r>
+              <a:rPr lang="en-US" dirty="0"/>
+              <a:t>Overlap of definitions of exposed and asymptomatic</a:t>
+            </a:r>
+          </a:p>
+          <a:p>
+            <a:r>
+              <a:rPr lang="en-US" dirty="0"/>
+              <a:t>Symptomatic but undiagnosed</a:t>
+            </a:r>
+          </a:p>
+          <a:p>
+            <a:pPr lvl="1"/>
+            <a:r>
+              <a:rPr lang="en-US" dirty="0"/>
+              <a:t>Recovery</a:t>
+            </a:r>
+          </a:p>
+          <a:p>
+            <a:pPr lvl="1"/>
+            <a:r>
+              <a:rPr lang="en-US" dirty="0"/>
+              <a:t>Mortality</a:t>
+            </a:r>
+          </a:p>
+          <a:p>
+            <a:r>
+              <a:rPr lang="en-US" dirty="0"/>
+              <a:t>Distribution cases</a:t>
+            </a:r>
+          </a:p>
+          <a:p>
+            <a:pPr lvl="1"/>
+            <a:r>
+              <a:rPr lang="en-US" dirty="0"/>
+              <a:t>Diagnosed symptomatic and diagnosed asymptomatic</a:t>
+            </a:r>
+          </a:p>
+          <a:p>
+            <a:r>
+              <a:rPr lang="en-US" dirty="0"/>
+              <a:t>Conversion of diagnosis rate to number of tests, or vice-versa</a:t>
+            </a:r>
+          </a:p>
+        </p:txBody>
+      </p:sp>
+    </p:spTree>
+    <p:extLst>
+      <p:ext uri="{BB962C8B-B14F-4D97-AF65-F5344CB8AC3E}">
+        <p14:creationId xmlns:p14="http://schemas.microsoft.com/office/powerpoint/2010/main" val="1547642266"/>
+      </p:ext>
+    </p:extLst>
+  </p:cSld>
+  <p:clrMapOvr>
+    <a:masterClrMapping/>
+  </p:clrMapOvr>
+</p:sld>
+</file>
+
+<file path=ppt/slides/slide20.xml><?xml version="1.0" encoding="utf-8"?>
 <p:sld xmlns:a="http://schemas.openxmlformats.org/drawingml/2006/main" xmlns:r="http://schemas.openxmlformats.org/officeDocument/2006/relationships" xmlns:p="http://schemas.openxmlformats.org/presentationml/2006/main">
   <p:cSld>
     <p:spTree>
@@ -12059,132 +16409,7 @@
 </p:sld>
 </file>
 
-<file path=ppt/slides/slide2.xml><?xml version="1.0" encoding="utf-8"?>
-<p:sld xmlns:a="http://schemas.openxmlformats.org/drawingml/2006/main" xmlns:r="http://schemas.openxmlformats.org/officeDocument/2006/relationships" xmlns:p="http://schemas.openxmlformats.org/presentationml/2006/main">
-  <p:cSld>
-    <p:spTree>
-      <p:nvGrpSpPr>
-        <p:cNvPr id="1" name=""/>
-        <p:cNvGrpSpPr/>
-        <p:nvPr/>
-      </p:nvGrpSpPr>
-      <p:grpSpPr>
-        <a:xfrm>
-          <a:off x="0" y="0"/>
-          <a:ext cx="0" cy="0"/>
-          <a:chOff x="0" y="0"/>
-          <a:chExt cx="0" cy="0"/>
-        </a:xfrm>
-      </p:grpSpPr>
-      <p:sp>
-        <p:nvSpPr>
-          <p:cNvPr id="2" name="Title 1">
-            <a:extLst>
-              <a:ext uri="{FF2B5EF4-FFF2-40B4-BE49-F238E27FC236}">
-                <a16:creationId xmlns:a16="http://schemas.microsoft.com/office/drawing/2014/main" id="{000B5B19-0E3C-8A49-934B-01961D5DB014}"/>
-              </a:ext>
-            </a:extLst>
-          </p:cNvPr>
-          <p:cNvSpPr>
-            <a:spLocks noGrp="1"/>
-          </p:cNvSpPr>
-          <p:nvPr>
-            <p:ph type="title"/>
-          </p:nvPr>
-        </p:nvSpPr>
-        <p:spPr/>
-        <p:txBody>
-          <a:bodyPr/>
-          <a:lstStyle/>
-          <a:p>
-            <a:r>
-              <a:rPr lang="en-US" dirty="0"/>
-              <a:t>Questions</a:t>
-            </a:r>
-          </a:p>
-        </p:txBody>
-      </p:sp>
-      <p:sp>
-        <p:nvSpPr>
-          <p:cNvPr id="3" name="Content Placeholder 2">
-            <a:extLst>
-              <a:ext uri="{FF2B5EF4-FFF2-40B4-BE49-F238E27FC236}">
-                <a16:creationId xmlns:a16="http://schemas.microsoft.com/office/drawing/2014/main" id="{A64E80B4-1E36-4F45-B98B-D8D78A6A7AA2}"/>
-              </a:ext>
-            </a:extLst>
-          </p:cNvPr>
-          <p:cNvSpPr>
-            <a:spLocks noGrp="1"/>
-          </p:cNvSpPr>
-          <p:nvPr>
-            <p:ph idx="1"/>
-          </p:nvPr>
-        </p:nvSpPr>
-        <p:spPr/>
-        <p:txBody>
-          <a:bodyPr/>
-          <a:lstStyle/>
-          <a:p>
-            <a:r>
-              <a:rPr lang="en-US" dirty="0"/>
-              <a:t>Overlap of definitions of exposed and asymptomatic</a:t>
-            </a:r>
-          </a:p>
-          <a:p>
-            <a:r>
-              <a:rPr lang="en-US" dirty="0"/>
-              <a:t>Symptomatic but undiagnosed</a:t>
-            </a:r>
-          </a:p>
-          <a:p>
-            <a:pPr lvl="1"/>
-            <a:r>
-              <a:rPr lang="en-US" dirty="0"/>
-              <a:t>Recovery</a:t>
-            </a:r>
-          </a:p>
-          <a:p>
-            <a:pPr lvl="1"/>
-            <a:r>
-              <a:rPr lang="en-US" dirty="0"/>
-              <a:t>Mortality</a:t>
-            </a:r>
-          </a:p>
-          <a:p>
-            <a:r>
-              <a:rPr lang="en-US" dirty="0"/>
-              <a:t>Distribution cases</a:t>
-            </a:r>
-          </a:p>
-          <a:p>
-            <a:pPr lvl="1"/>
-            <a:r>
-              <a:rPr lang="en-US" dirty="0"/>
-              <a:t>Diagnosed symptomatic and diagnosed asymptomatic</a:t>
-            </a:r>
-          </a:p>
-          <a:p>
-            <a:r>
-              <a:rPr lang="en-US" dirty="0"/>
-              <a:t>Conversion of diagnosis rate to number of tests, or vice-versa</a:t>
-            </a:r>
-          </a:p>
-        </p:txBody>
-      </p:sp>
-    </p:spTree>
-    <p:extLst>
-      <p:ext uri="{BB962C8B-B14F-4D97-AF65-F5344CB8AC3E}">
-        <p14:creationId xmlns:p14="http://schemas.microsoft.com/office/powerpoint/2010/main" val="1547642266"/>
-      </p:ext>
-    </p:extLst>
-  </p:cSld>
-  <p:clrMapOvr>
-    <a:masterClrMapping/>
-  </p:clrMapOvr>
-</p:sld>
-</file>
-
-<file path=ppt/slides/slide20.xml><?xml version="1.0" encoding="utf-8"?>
+<file path=ppt/slides/slide21.xml><?xml version="1.0" encoding="utf-8"?>
 <p:sld xmlns:a="http://schemas.openxmlformats.org/drawingml/2006/main" xmlns:r="http://schemas.openxmlformats.org/officeDocument/2006/relationships" xmlns:p="http://schemas.openxmlformats.org/presentationml/2006/main">
   <p:cSld>
     <p:spTree>
@@ -12428,7 +16653,7 @@
 </p:sld>
 </file>
 
-<file path=ppt/slides/slide21.xml><?xml version="1.0" encoding="utf-8"?>
+<file path=ppt/slides/slide22.xml><?xml version="1.0" encoding="utf-8"?>
 <p:sld xmlns:a="http://schemas.openxmlformats.org/drawingml/2006/main" xmlns:r="http://schemas.openxmlformats.org/officeDocument/2006/relationships" xmlns:p="http://schemas.openxmlformats.org/presentationml/2006/main">
   <p:cSld>
     <p:spTree>

</xml_diff>